<commit_message>
added some detail to param parser slide
</commit_message>
<xml_diff>
--- a/DynamicFilters_Presentation_Eng.pptx
+++ b/DynamicFilters_Presentation_Eng.pptx
@@ -3280,7 +3280,7 @@
           <a:p>
             <a:fld id="{61F4F17F-797E-F743-99C7-34FA65335D3C}" type="datetimeFigureOut">
               <a:rPr lang="en-US" smtClean="0"/>
-              <a:t>4/29/2019</a:t>
+              <a:t>4/30/2019</a:t>
             </a:fld>
             <a:endParaRPr lang="en-US"/>
           </a:p>
@@ -3446,7 +3446,7 @@
           <a:p>
             <a:fld id="{A76353FC-0869-45D3-95AF-CC29198471C2}" type="datetimeFigureOut">
               <a:rPr lang="en-US" smtClean="0"/>
-              <a:t>4/29/2019</a:t>
+              <a:t>4/30/2019</a:t>
             </a:fld>
             <a:endParaRPr lang="en-US"/>
           </a:p>
@@ -15410,30 +15410,60 @@
                             </p:stCondLst>
                             <p:childTnLst>
                               <p:par>
-                                <p:cTn id="37" presetID="26" presetClass="exit" presetSubtype="0" fill="hold" grpId="1" nodeType="clickEffect">
+                                <p:cTn id="37" presetID="15" presetClass="exit" presetSubtype="0" fill="hold" grpId="1" nodeType="clickEffect">
                                   <p:stCondLst>
                                     <p:cond delay="0"/>
                                   </p:stCondLst>
                                   <p:childTnLst>
-                                    <p:animEffect transition="out" filter="wipe(down)">
+                                    <p:anim calcmode="lin" valueType="num">
                                       <p:cBhvr>
-                                        <p:cTn id="38" dur="180" accel="50000">
-                                          <p:stCondLst>
-                                            <p:cond delay="1820"/>
-                                          </p:stCondLst>
-                                        </p:cTn>
+                                        <p:cTn id="38" dur="1000"/>
                                         <p:tgtEl>
                                           <p:spTgt spid="2"/>
                                         </p:tgtEl>
+                                        <p:attrNameLst>
+                                          <p:attrName>ppt_w</p:attrName>
+                                        </p:attrNameLst>
                                       </p:cBhvr>
-                                    </p:animEffect>
+                                      <p:tavLst>
+                                        <p:tav tm="0">
+                                          <p:val>
+                                            <p:strVal val="ppt_w"/>
+                                          </p:val>
+                                        </p:tav>
+                                        <p:tav tm="100000">
+                                          <p:val>
+                                            <p:fltVal val="0"/>
+                                          </p:val>
+                                        </p:tav>
+                                      </p:tavLst>
+                                    </p:anim>
                                     <p:anim calcmode="lin" valueType="num">
                                       <p:cBhvr>
-                                        <p:cTn id="39" dur="1822" tmFilter="0,0; 0.14,0.31; 0.43,0.73; 0.71,0.91; 1.0,1.0">
-                                          <p:stCondLst>
-                                            <p:cond delay="0"/>
-                                          </p:stCondLst>
-                                        </p:cTn>
+                                        <p:cTn id="39" dur="1000"/>
+                                        <p:tgtEl>
+                                          <p:spTgt spid="2"/>
+                                        </p:tgtEl>
+                                        <p:attrNameLst>
+                                          <p:attrName>ppt_h</p:attrName>
+                                        </p:attrNameLst>
+                                      </p:cBhvr>
+                                      <p:tavLst>
+                                        <p:tav tm="0">
+                                          <p:val>
+                                            <p:strVal val="ppt_h"/>
+                                          </p:val>
+                                        </p:tav>
+                                        <p:tav tm="100000">
+                                          <p:val>
+                                            <p:fltVal val="0"/>
+                                          </p:val>
+                                        </p:tav>
+                                      </p:tavLst>
+                                    </p:anim>
+                                    <p:anim calcmode="lin" valueType="num">
+                                      <p:cBhvr>
+                                        <p:cTn id="40" dur="1000"/>
                                         <p:tgtEl>
                                           <p:spTgt spid="2"/>
                                         </p:tgtEl>
@@ -15447,47 +15477,111 @@
                                             <p:strVal val="ppt_x"/>
                                           </p:val>
                                         </p:tav>
+                                        <p:tav tm="5000">
+                                          <p:val>
+                                            <p:strVal val="ppt_x+-0.0500*(ppt_x*0.9511+(1-ppt_y)*0.3090)"/>
+                                          </p:val>
+                                        </p:tav>
+                                        <p:tav tm="10000">
+                                          <p:val>
+                                            <p:strVal val="ppt_x+-0.1000*(ppt_x*0.8090+(1-ppt_y)*0.5878)"/>
+                                          </p:val>
+                                        </p:tav>
+                                        <p:tav tm="15000">
+                                          <p:val>
+                                            <p:strVal val="ppt_x+-0.1500*(ppt_x*0.5878+(1-ppt_y)*0.8090)"/>
+                                          </p:val>
+                                        </p:tav>
+                                        <p:tav tm="20000">
+                                          <p:val>
+                                            <p:strVal val="ppt_x+-0.2000*(ppt_x*0.3090+(1-ppt_y)*0.9511)"/>
+                                          </p:val>
+                                        </p:tav>
+                                        <p:tav tm="25000">
+                                          <p:val>
+                                            <p:strVal val="ppt_x+-0.2500*(ppt_x*-0.0000+(1-ppt_y)*1.0000)"/>
+                                          </p:val>
+                                        </p:tav>
+                                        <p:tav tm="30000">
+                                          <p:val>
+                                            <p:strVal val="ppt_x+-0.3000*(ppt_x*-0.3090+(1-ppt_y)*0.9511)"/>
+                                          </p:val>
+                                        </p:tav>
+                                        <p:tav tm="35000">
+                                          <p:val>
+                                            <p:strVal val="ppt_x+-0.3500*(ppt_x*-0.5878+(1-ppt_y)*0.8090)"/>
+                                          </p:val>
+                                        </p:tav>
+                                        <p:tav tm="40000">
+                                          <p:val>
+                                            <p:strVal val="ppt_x+-0.4000*(ppt_x*-0.8090+(1-ppt_y)*0.5878)"/>
+                                          </p:val>
+                                        </p:tav>
+                                        <p:tav tm="45000">
+                                          <p:val>
+                                            <p:strVal val="ppt_x+-0.4500*(ppt_x*-0.9511+(1-ppt_y)*0.3090)"/>
+                                          </p:val>
+                                        </p:tav>
+                                        <p:tav tm="50000">
+                                          <p:val>
+                                            <p:strVal val="ppt_x+-0.5000*(ppt_x*-1.0000+(1-ppt_y)*-0.0000)"/>
+                                          </p:val>
+                                        </p:tav>
+                                        <p:tav tm="55000">
+                                          <p:val>
+                                            <p:strVal val="ppt_x+-0.5500*(ppt_x*-0.9511+(1-ppt_y)*-0.3090)"/>
+                                          </p:val>
+                                        </p:tav>
+                                        <p:tav tm="60000">
+                                          <p:val>
+                                            <p:strVal val="ppt_x+-0.6000*(ppt_x*-0.8090+(1-ppt_y)*-0.5878)"/>
+                                          </p:val>
+                                        </p:tav>
+                                        <p:tav tm="65000">
+                                          <p:val>
+                                            <p:strVal val="ppt_x+-0.6500*(ppt_x*-0.5878+(1-ppt_y)*-0.8090)"/>
+                                          </p:val>
+                                        </p:tav>
+                                        <p:tav tm="70000">
+                                          <p:val>
+                                            <p:strVal val="ppt_x+-0.7000*(ppt_x*-0.3090+(1-ppt_y)*-0.9511)"/>
+                                          </p:val>
+                                        </p:tav>
+                                        <p:tav tm="75000">
+                                          <p:val>
+                                            <p:strVal val="ppt_x+-0.7500*(ppt_x*0.0000+(1-ppt_y)*-1.0000)"/>
+                                          </p:val>
+                                        </p:tav>
+                                        <p:tav tm="80000">
+                                          <p:val>
+                                            <p:strVal val="ppt_x+-0.8000*(ppt_x*0.3090+(1-ppt_y)*-0.9511)"/>
+                                          </p:val>
+                                        </p:tav>
+                                        <p:tav tm="85000">
+                                          <p:val>
+                                            <p:strVal val="ppt_x+-0.8500*(ppt_x*0.5878+(1-ppt_y)*-0.8090)"/>
+                                          </p:val>
+                                        </p:tav>
+                                        <p:tav tm="90000">
+                                          <p:val>
+                                            <p:strVal val="ppt_x+-0.9000*(ppt_x*0.8090+(1-ppt_y)*-0.5878)"/>
+                                          </p:val>
+                                        </p:tav>
+                                        <p:tav tm="95000">
+                                          <p:val>
+                                            <p:strVal val="ppt_x+-0.9500*(ppt_x*0.9511+(1-ppt_y)*-0.3090)"/>
+                                          </p:val>
+                                        </p:tav>
                                         <p:tav tm="100000">
                                           <p:val>
-                                            <p:strVal val="#ppt_x+0.25"/>
+                                            <p:strVal val="ppt_x+-1.0000*(ppt_x*1.0000+(1-ppt_y)*0.0000)"/>
                                           </p:val>
                                         </p:tav>
                                       </p:tavLst>
                                     </p:anim>
                                     <p:anim calcmode="lin" valueType="num">
                                       <p:cBhvr>
-                                        <p:cTn id="40" dur="178">
-                                          <p:stCondLst>
-                                            <p:cond delay="1822"/>
-                                          </p:stCondLst>
-                                        </p:cTn>
-                                        <p:tgtEl>
-                                          <p:spTgt spid="2"/>
-                                        </p:tgtEl>
-                                        <p:attrNameLst>
-                                          <p:attrName>ppt_x</p:attrName>
-                                        </p:attrNameLst>
-                                      </p:cBhvr>
-                                      <p:tavLst>
-                                        <p:tav tm="0">
-                                          <p:val>
-                                            <p:strVal val="ppt_x"/>
-                                          </p:val>
-                                        </p:tav>
-                                        <p:tav tm="100000">
-                                          <p:val>
-                                            <p:strVal val="ppt_x"/>
-                                          </p:val>
-                                        </p:tav>
-                                      </p:tavLst>
-                                    </p:anim>
-                                    <p:anim calcmode="lin" valueType="num">
-                                      <p:cBhvr>
-                                        <p:cTn id="41" dur="664" tmFilter="0.0,0.0;0.25,0.07;0.50,0.2;0.75,0.467;1.0,1.0">
-                                          <p:stCondLst>
-                                            <p:cond delay="0"/>
-                                          </p:stCondLst>
-                                        </p:cTn>
+                                        <p:cTn id="41" dur="1000"/>
                                         <p:tgtEl>
                                           <p:spTgt spid="2"/>
                                         </p:tgtEl>
@@ -15503,418 +15597,111 @@
                                         </p:tav>
                                         <p:tav tm="5000">
                                           <p:val>
-                                            <p:strVal val="ppt_y+0.026"/>
+                                            <p:strVal val="ppt_y+-0.0500*(ppt_x*0.3090-(1-ppt_y)*0.9511)"/>
                                           </p:val>
                                         </p:tav>
                                         <p:tav tm="10000">
                                           <p:val>
-                                            <p:strVal val="ppt_y+0.052"/>
+                                            <p:strVal val="ppt_y+-0.1000*(ppt_x*0.5878-(1-ppt_y)*0.8090)"/>
                                           </p:val>
                                         </p:tav>
                                         <p:tav tm="15000">
                                           <p:val>
-                                            <p:strVal val="ppt_y+0.078"/>
+                                            <p:strVal val="ppt_y+-0.1500*(ppt_x*0.8090-(1-ppt_y)*0.5878)"/>
                                           </p:val>
                                         </p:tav>
                                         <p:tav tm="20000">
                                           <p:val>
-                                            <p:strVal val="ppt_y+0.103"/>
+                                            <p:strVal val="ppt_y+-0.2000*(ppt_x*0.9511-(1-ppt_y)*0.3090)"/>
+                                          </p:val>
+                                        </p:tav>
+                                        <p:tav tm="25000">
+                                          <p:val>
+                                            <p:strVal val="ppt_y+-0.2500*(ppt_x*1.0000-(1-ppt_y)*-0.0000)"/>
                                           </p:val>
                                         </p:tav>
                                         <p:tav tm="30000">
                                           <p:val>
-                                            <p:strVal val="ppt_y+0.151"/>
+                                            <p:strVal val="ppt_y+-0.3000*(ppt_x*0.9511-(1-ppt_y)*-0.3090)"/>
+                                          </p:val>
+                                        </p:tav>
+                                        <p:tav tm="35000">
+                                          <p:val>
+                                            <p:strVal val="ppt_y+-0.3500*(ppt_x*0.8090-(1-ppt_y)*-0.5878)"/>
                                           </p:val>
                                         </p:tav>
                                         <p:tav tm="40000">
                                           <p:val>
-                                            <p:strVal val="ppt_y+0.196"/>
+                                            <p:strVal val="ppt_y+-0.4000*(ppt_x*0.5878-(1-ppt_y)*-0.8090)"/>
+                                          </p:val>
+                                        </p:tav>
+                                        <p:tav tm="45000">
+                                          <p:val>
+                                            <p:strVal val="ppt_y+-0.4500*(ppt_x*0.3090-(1-ppt_y)*-0.9511)"/>
                                           </p:val>
                                         </p:tav>
                                         <p:tav tm="50000">
                                           <p:val>
-                                            <p:strVal val="ppt_y+0.236"/>
+                                            <p:strVal val="ppt_y+-0.5000*(ppt_x*-0.0000-(1-ppt_y)*-1.0000)"/>
+                                          </p:val>
+                                        </p:tav>
+                                        <p:tav tm="55000">
+                                          <p:val>
+                                            <p:strVal val="ppt_y+-0.5500*(ppt_x*-0.3090-(1-ppt_y)*-0.9511)"/>
                                           </p:val>
                                         </p:tav>
                                         <p:tav tm="60000">
                                           <p:val>
-                                            <p:strVal val="ppt_y+0.270"/>
+                                            <p:strVal val="ppt_y+-0.6000*(ppt_x*-0.5878-(1-ppt_y)*-0.8090)"/>
+                                          </p:val>
+                                        </p:tav>
+                                        <p:tav tm="65000">
+                                          <p:val>
+                                            <p:strVal val="ppt_y+-0.6500*(ppt_x*-0.8090-(1-ppt_y)*-0.5878)"/>
                                           </p:val>
                                         </p:tav>
                                         <p:tav tm="70000">
                                           <p:val>
-                                            <p:strVal val="ppt_y+0.297"/>
+                                            <p:strVal val="ppt_y+-0.7000*(ppt_x*-0.9511-(1-ppt_y)*-0.3090)"/>
+                                          </p:val>
+                                        </p:tav>
+                                        <p:tav tm="75000">
+                                          <p:val>
+                                            <p:strVal val="ppt_y+-0.7500*(ppt_x*-1.0000-(1-ppt_y)*0.0000)"/>
                                           </p:val>
                                         </p:tav>
                                         <p:tav tm="80000">
                                           <p:val>
-                                            <p:strVal val="ppt_y+0.317"/>
+                                            <p:strVal val="ppt_y+-0.8000*(ppt_x*-0.9511-(1-ppt_y)*0.3090)"/>
+                                          </p:val>
+                                        </p:tav>
+                                        <p:tav tm="85000">
+                                          <p:val>
+                                            <p:strVal val="ppt_y+-0.8500*(ppt_x*-0.8090-(1-ppt_y)*0.5878)"/>
                                           </p:val>
                                         </p:tav>
                                         <p:tav tm="90000">
                                           <p:val>
-                                            <p:strVal val="ppt_y+0.329"/>
+                                            <p:strVal val="ppt_y+-0.9000*(ppt_x*-0.5878-(1-ppt_y)*0.8090)"/>
+                                          </p:val>
+                                        </p:tav>
+                                        <p:tav tm="95000">
+                                          <p:val>
+                                            <p:strVal val="ppt_y+-0.9500*(ppt_x*-0.3090-(1-ppt_y)*0.9511)"/>
                                           </p:val>
                                         </p:tav>
                                         <p:tav tm="100000">
                                           <p:val>
-                                            <p:strVal val="ppt_y+0.333"/>
+                                            <p:strVal val="ppt_y+-1.0000*(ppt_x*0.0000-(1-ppt_y)*1.0000)"/>
                                           </p:val>
                                         </p:tav>
                                       </p:tavLst>
                                     </p:anim>
-                                    <p:anim calcmode="lin" valueType="num">
-                                      <p:cBhvr>
-                                        <p:cTn id="42" dur="664" tmFilter="0, 0; 0.125,0.2665; 0.25,0.4; 0.375,0.465; 0.5,0.5;  0.625,0.535; 0.75,0.6; 0.875,0.7335; 1,1">
-                                          <p:stCondLst>
-                                            <p:cond delay="664"/>
-                                          </p:stCondLst>
-                                        </p:cTn>
-                                        <p:tgtEl>
-                                          <p:spTgt spid="2"/>
-                                        </p:tgtEl>
-                                        <p:attrNameLst>
-                                          <p:attrName>ppt_y</p:attrName>
-                                        </p:attrNameLst>
-                                      </p:cBhvr>
-                                      <p:tavLst>
-                                        <p:tav tm="0">
-                                          <p:val>
-                                            <p:strVal val="ppt_y"/>
-                                          </p:val>
-                                        </p:tav>
-                                        <p:tav tm="10000">
-                                          <p:val>
-                                            <p:strVal val="ppt_y-0.034"/>
-                                          </p:val>
-                                        </p:tav>
-                                        <p:tav tm="20000">
-                                          <p:val>
-                                            <p:strVal val="ppt_y-0.065"/>
-                                          </p:val>
-                                        </p:tav>
-                                        <p:tav tm="30000">
-                                          <p:val>
-                                            <p:strVal val="ppt_y-0.090"/>
-                                          </p:val>
-                                        </p:tav>
-                                        <p:tav tm="40000">
-                                          <p:val>
-                                            <p:strVal val="ppt_y-0.106"/>
-                                          </p:val>
-                                        </p:tav>
-                                        <p:tav tm="50000">
-                                          <p:val>
-                                            <p:strVal val="ppt_y-0.111"/>
-                                          </p:val>
-                                        </p:tav>
-                                        <p:tav tm="60000">
-                                          <p:val>
-                                            <p:strVal val="ppt_y-0.106"/>
-                                          </p:val>
-                                        </p:tav>
-                                        <p:tav tm="70000">
-                                          <p:val>
-                                            <p:strVal val="ppt_y-0.090"/>
-                                          </p:val>
-                                        </p:tav>
-                                        <p:tav tm="80000">
-                                          <p:val>
-                                            <p:strVal val="ppt_y-0.065"/>
-                                          </p:val>
-                                        </p:tav>
-                                        <p:tav tm="90000">
-                                          <p:val>
-                                            <p:strVal val="ppt_y-0.034"/>
-                                          </p:val>
-                                        </p:tav>
-                                        <p:tav tm="100000">
-                                          <p:val>
-                                            <p:strVal val="ppt_y"/>
-                                          </p:val>
-                                        </p:tav>
-                                      </p:tavLst>
-                                    </p:anim>
-                                    <p:anim calcmode="lin" valueType="num">
-                                      <p:cBhvr>
-                                        <p:cTn id="43" dur="332" tmFilter="0, 0; 0.125,0.2665; 0.25,0.4; 0.375,0.465; 0.5,0.5;  0.625,0.535; 0.75,0.6; 0.875,0.7335; 1,1">
-                                          <p:stCondLst>
-                                            <p:cond delay="1324"/>
-                                          </p:stCondLst>
-                                        </p:cTn>
-                                        <p:tgtEl>
-                                          <p:spTgt spid="2"/>
-                                        </p:tgtEl>
-                                        <p:attrNameLst>
-                                          <p:attrName>ppt_y</p:attrName>
-                                        </p:attrNameLst>
-                                      </p:cBhvr>
-                                      <p:tavLst>
-                                        <p:tav tm="0">
-                                          <p:val>
-                                            <p:strVal val="ppt_y"/>
-                                          </p:val>
-                                        </p:tav>
-                                        <p:tav tm="10000">
-                                          <p:val>
-                                            <p:strVal val="ppt_y-0.011"/>
-                                          </p:val>
-                                        </p:tav>
-                                        <p:tav tm="20000">
-                                          <p:val>
-                                            <p:strVal val="ppt_y-0.022"/>
-                                          </p:val>
-                                        </p:tav>
-                                        <p:tav tm="30000">
-                                          <p:val>
-                                            <p:strVal val="ppt_y-0.030"/>
-                                          </p:val>
-                                        </p:tav>
-                                        <p:tav tm="40000">
-                                          <p:val>
-                                            <p:strVal val="ppt_y-0.035"/>
-                                          </p:val>
-                                        </p:tav>
-                                        <p:tav tm="50000">
-                                          <p:val>
-                                            <p:strVal val="ppt_y-0.037"/>
-                                          </p:val>
-                                        </p:tav>
-                                        <p:tav tm="60000">
-                                          <p:val>
-                                            <p:strVal val="ppt_y-0.035"/>
-                                          </p:val>
-                                        </p:tav>
-                                        <p:tav tm="70000">
-                                          <p:val>
-                                            <p:strVal val="ppt_y-0.030"/>
-                                          </p:val>
-                                        </p:tav>
-                                        <p:tav tm="80000">
-                                          <p:val>
-                                            <p:strVal val="ppt_y-0.022"/>
-                                          </p:val>
-                                        </p:tav>
-                                        <p:tav tm="90000">
-                                          <p:val>
-                                            <p:strVal val="ppt_y-0.011"/>
-                                          </p:val>
-                                        </p:tav>
-                                        <p:tav tm="100000">
-                                          <p:val>
-                                            <p:strVal val="ppt_y"/>
-                                          </p:val>
-                                        </p:tav>
-                                      </p:tavLst>
-                                    </p:anim>
-                                    <p:anim calcmode="lin" valueType="num">
-                                      <p:cBhvr>
-                                        <p:cTn id="44" dur="164" tmFilter="0, 0; 0.125,0.2665; 0.25,0.4; 0.375,0.465; 0.5,0.5;  0.625,0.535; 0.75,0.6; 0.875,0.7335; 1,1">
-                                          <p:stCondLst>
-                                            <p:cond delay="1656"/>
-                                          </p:stCondLst>
-                                        </p:cTn>
-                                        <p:tgtEl>
-                                          <p:spTgt spid="2"/>
-                                        </p:tgtEl>
-                                        <p:attrNameLst>
-                                          <p:attrName>ppt_y</p:attrName>
-                                        </p:attrNameLst>
-                                      </p:cBhvr>
-                                      <p:tavLst>
-                                        <p:tav tm="0">
-                                          <p:val>
-                                            <p:strVal val="ppt_y"/>
-                                          </p:val>
-                                        </p:tav>
-                                        <p:tav tm="10000">
-                                          <p:val>
-                                            <p:strVal val="ppt_y-0.004"/>
-                                          </p:val>
-                                        </p:tav>
-                                        <p:tav tm="20000">
-                                          <p:val>
-                                            <p:strVal val="ppt_y-0.007"/>
-                                          </p:val>
-                                        </p:tav>
-                                        <p:tav tm="30000">
-                                          <p:val>
-                                            <p:strVal val="ppt_y-0.010"/>
-                                          </p:val>
-                                        </p:tav>
-                                        <p:tav tm="40000">
-                                          <p:val>
-                                            <p:strVal val="ppt_y-0.012"/>
-                                          </p:val>
-                                        </p:tav>
-                                        <p:tav tm="50000">
-                                          <p:val>
-                                            <p:strVal val="ppt_y-0.0123"/>
-                                          </p:val>
-                                        </p:tav>
-                                        <p:tav tm="60000">
-                                          <p:val>
-                                            <p:strVal val="ppt_y-0.012"/>
-                                          </p:val>
-                                        </p:tav>
-                                        <p:tav tm="70000">
-                                          <p:val>
-                                            <p:strVal val="ppt_y-0.010"/>
-                                          </p:val>
-                                        </p:tav>
-                                        <p:tav tm="80000">
-                                          <p:val>
-                                            <p:strVal val="ppt_y-0.007"/>
-                                          </p:val>
-                                        </p:tav>
-                                        <p:tav tm="90000">
-                                          <p:val>
-                                            <p:strVal val="ppt_y-0.004"/>
-                                          </p:val>
-                                        </p:tav>
-                                        <p:tav tm="100000">
-                                          <p:val>
-                                            <p:strVal val="ppt_y"/>
-                                          </p:val>
-                                        </p:tav>
-                                      </p:tavLst>
-                                    </p:anim>
-                                    <p:anim calcmode="lin" valueType="num">
-                                      <p:cBhvr>
-                                        <p:cTn id="45" dur="180" accel="50000">
-                                          <p:stCondLst>
-                                            <p:cond delay="1820"/>
-                                          </p:stCondLst>
-                                        </p:cTn>
-                                        <p:tgtEl>
-                                          <p:spTgt spid="2"/>
-                                        </p:tgtEl>
-                                        <p:attrNameLst>
-                                          <p:attrName>ppt_y</p:attrName>
-                                        </p:attrNameLst>
-                                      </p:cBhvr>
-                                      <p:tavLst>
-                                        <p:tav tm="0">
-                                          <p:val>
-                                            <p:strVal val="ppt_y"/>
-                                          </p:val>
-                                        </p:tav>
-                                        <p:tav tm="100000">
-                                          <p:val>
-                                            <p:strVal val="ppt_y+ppt_h"/>
-                                          </p:val>
-                                        </p:tav>
-                                      </p:tavLst>
-                                    </p:anim>
-                                    <p:animScale>
-                                      <p:cBhvr>
-                                        <p:cTn id="46" dur="26">
-                                          <p:stCondLst>
-                                            <p:cond delay="620"/>
-                                          </p:stCondLst>
-                                        </p:cTn>
-                                        <p:tgtEl>
-                                          <p:spTgt spid="2"/>
-                                        </p:tgtEl>
-                                      </p:cBhvr>
-                                      <p:to x="100000" y="60000"/>
-                                    </p:animScale>
-                                    <p:animScale>
-                                      <p:cBhvr>
-                                        <p:cTn id="47" dur="166" decel="50000">
-                                          <p:stCondLst>
-                                            <p:cond delay="646"/>
-                                          </p:stCondLst>
-                                        </p:cTn>
-                                        <p:tgtEl>
-                                          <p:spTgt spid="2"/>
-                                        </p:tgtEl>
-                                      </p:cBhvr>
-                                      <p:to x="100000" y="100000"/>
-                                    </p:animScale>
-                                    <p:animScale>
-                                      <p:cBhvr>
-                                        <p:cTn id="48" dur="26">
-                                          <p:stCondLst>
-                                            <p:cond delay="1312"/>
-                                          </p:stCondLst>
-                                        </p:cTn>
-                                        <p:tgtEl>
-                                          <p:spTgt spid="2"/>
-                                        </p:tgtEl>
-                                      </p:cBhvr>
-                                      <p:to x="100000" y="80000"/>
-                                    </p:animScale>
-                                    <p:animScale>
-                                      <p:cBhvr>
-                                        <p:cTn id="49" dur="166" decel="50000">
-                                          <p:stCondLst>
-                                            <p:cond delay="1338"/>
-                                          </p:stCondLst>
-                                        </p:cTn>
-                                        <p:tgtEl>
-                                          <p:spTgt spid="2"/>
-                                        </p:tgtEl>
-                                      </p:cBhvr>
-                                      <p:to x="100000" y="100000"/>
-                                    </p:animScale>
-                                    <p:animScale>
-                                      <p:cBhvr>
-                                        <p:cTn id="50" dur="26">
-                                          <p:stCondLst>
-                                            <p:cond delay="1642"/>
-                                          </p:stCondLst>
-                                        </p:cTn>
-                                        <p:tgtEl>
-                                          <p:spTgt spid="2"/>
-                                        </p:tgtEl>
-                                      </p:cBhvr>
-                                      <p:to x="100000" y="90000"/>
-                                    </p:animScale>
-                                    <p:animScale>
-                                      <p:cBhvr>
-                                        <p:cTn id="51" dur="166" decel="50000">
-                                          <p:stCondLst>
-                                            <p:cond delay="1668"/>
-                                          </p:stCondLst>
-                                        </p:cTn>
-                                        <p:tgtEl>
-                                          <p:spTgt spid="2"/>
-                                        </p:tgtEl>
-                                      </p:cBhvr>
-                                      <p:to x="100000" y="100000"/>
-                                    </p:animScale>
-                                    <p:animScale>
-                                      <p:cBhvr>
-                                        <p:cTn id="52" dur="26">
-                                          <p:stCondLst>
-                                            <p:cond delay="1808"/>
-                                          </p:stCondLst>
-                                        </p:cTn>
-                                        <p:tgtEl>
-                                          <p:spTgt spid="2"/>
-                                        </p:tgtEl>
-                                      </p:cBhvr>
-                                      <p:to x="100000" y="95000"/>
-                                    </p:animScale>
-                                    <p:animScale>
-                                      <p:cBhvr>
-                                        <p:cTn id="53" dur="166" decel="50000">
-                                          <p:stCondLst>
-                                            <p:cond delay="1834"/>
-                                          </p:stCondLst>
-                                        </p:cTn>
-                                        <p:tgtEl>
-                                          <p:spTgt spid="2"/>
-                                        </p:tgtEl>
-                                      </p:cBhvr>
-                                      <p:to x="100000" y="100000"/>
-                                    </p:animScale>
                                     <p:set>
                                       <p:cBhvr>
-                                        <p:cTn id="54" dur="1" fill="hold">
+                                        <p:cTn id="42" dur="1" fill="hold">
                                           <p:stCondLst>
-                                            <p:cond delay="1999"/>
+                                            <p:cond delay="999"/>
                                           </p:stCondLst>
                                         </p:cTn>
                                         <p:tgtEl>
@@ -15932,30 +15719,60 @@
                                 </p:cTn>
                               </p:par>
                               <p:par>
-                                <p:cTn id="55" presetID="26" presetClass="exit" presetSubtype="0" fill="hold" grpId="1" nodeType="withEffect">
+                                <p:cTn id="43" presetID="15" presetClass="exit" presetSubtype="0" fill="hold" grpId="1" nodeType="withEffect">
                                   <p:stCondLst>
                                     <p:cond delay="0"/>
                                   </p:stCondLst>
                                   <p:childTnLst>
-                                    <p:animEffect transition="out" filter="wipe(down)">
+                                    <p:anim calcmode="lin" valueType="num">
                                       <p:cBhvr>
-                                        <p:cTn id="56" dur="180" accel="50000">
-                                          <p:stCondLst>
-                                            <p:cond delay="1820"/>
-                                          </p:stCondLst>
-                                        </p:cTn>
+                                        <p:cTn id="44" dur="1000"/>
                                         <p:tgtEl>
                                           <p:spTgt spid="15"/>
                                         </p:tgtEl>
+                                        <p:attrNameLst>
+                                          <p:attrName>ppt_w</p:attrName>
+                                        </p:attrNameLst>
                                       </p:cBhvr>
-                                    </p:animEffect>
+                                      <p:tavLst>
+                                        <p:tav tm="0">
+                                          <p:val>
+                                            <p:strVal val="ppt_w"/>
+                                          </p:val>
+                                        </p:tav>
+                                        <p:tav tm="100000">
+                                          <p:val>
+                                            <p:fltVal val="0"/>
+                                          </p:val>
+                                        </p:tav>
+                                      </p:tavLst>
+                                    </p:anim>
                                     <p:anim calcmode="lin" valueType="num">
                                       <p:cBhvr>
-                                        <p:cTn id="57" dur="1822" tmFilter="0,0; 0.14,0.31; 0.43,0.73; 0.71,0.91; 1.0,1.0">
-                                          <p:stCondLst>
-                                            <p:cond delay="0"/>
-                                          </p:stCondLst>
-                                        </p:cTn>
+                                        <p:cTn id="45" dur="1000"/>
+                                        <p:tgtEl>
+                                          <p:spTgt spid="15"/>
+                                        </p:tgtEl>
+                                        <p:attrNameLst>
+                                          <p:attrName>ppt_h</p:attrName>
+                                        </p:attrNameLst>
+                                      </p:cBhvr>
+                                      <p:tavLst>
+                                        <p:tav tm="0">
+                                          <p:val>
+                                            <p:strVal val="ppt_h"/>
+                                          </p:val>
+                                        </p:tav>
+                                        <p:tav tm="100000">
+                                          <p:val>
+                                            <p:fltVal val="0"/>
+                                          </p:val>
+                                        </p:tav>
+                                      </p:tavLst>
+                                    </p:anim>
+                                    <p:anim calcmode="lin" valueType="num">
+                                      <p:cBhvr>
+                                        <p:cTn id="46" dur="1000"/>
                                         <p:tgtEl>
                                           <p:spTgt spid="15"/>
                                         </p:tgtEl>
@@ -15969,47 +15786,111 @@
                                             <p:strVal val="ppt_x"/>
                                           </p:val>
                                         </p:tav>
+                                        <p:tav tm="5000">
+                                          <p:val>
+                                            <p:strVal val="ppt_x+-0.0500*(ppt_x*0.9511+(1-ppt_y)*0.3090)"/>
+                                          </p:val>
+                                        </p:tav>
+                                        <p:tav tm="10000">
+                                          <p:val>
+                                            <p:strVal val="ppt_x+-0.1000*(ppt_x*0.8090+(1-ppt_y)*0.5878)"/>
+                                          </p:val>
+                                        </p:tav>
+                                        <p:tav tm="15000">
+                                          <p:val>
+                                            <p:strVal val="ppt_x+-0.1500*(ppt_x*0.5878+(1-ppt_y)*0.8090)"/>
+                                          </p:val>
+                                        </p:tav>
+                                        <p:tav tm="20000">
+                                          <p:val>
+                                            <p:strVal val="ppt_x+-0.2000*(ppt_x*0.3090+(1-ppt_y)*0.9511)"/>
+                                          </p:val>
+                                        </p:tav>
+                                        <p:tav tm="25000">
+                                          <p:val>
+                                            <p:strVal val="ppt_x+-0.2500*(ppt_x*-0.0000+(1-ppt_y)*1.0000)"/>
+                                          </p:val>
+                                        </p:tav>
+                                        <p:tav tm="30000">
+                                          <p:val>
+                                            <p:strVal val="ppt_x+-0.3000*(ppt_x*-0.3090+(1-ppt_y)*0.9511)"/>
+                                          </p:val>
+                                        </p:tav>
+                                        <p:tav tm="35000">
+                                          <p:val>
+                                            <p:strVal val="ppt_x+-0.3500*(ppt_x*-0.5878+(1-ppt_y)*0.8090)"/>
+                                          </p:val>
+                                        </p:tav>
+                                        <p:tav tm="40000">
+                                          <p:val>
+                                            <p:strVal val="ppt_x+-0.4000*(ppt_x*-0.8090+(1-ppt_y)*0.5878)"/>
+                                          </p:val>
+                                        </p:tav>
+                                        <p:tav tm="45000">
+                                          <p:val>
+                                            <p:strVal val="ppt_x+-0.4500*(ppt_x*-0.9511+(1-ppt_y)*0.3090)"/>
+                                          </p:val>
+                                        </p:tav>
+                                        <p:tav tm="50000">
+                                          <p:val>
+                                            <p:strVal val="ppt_x+-0.5000*(ppt_x*-1.0000+(1-ppt_y)*-0.0000)"/>
+                                          </p:val>
+                                        </p:tav>
+                                        <p:tav tm="55000">
+                                          <p:val>
+                                            <p:strVal val="ppt_x+-0.5500*(ppt_x*-0.9511+(1-ppt_y)*-0.3090)"/>
+                                          </p:val>
+                                        </p:tav>
+                                        <p:tav tm="60000">
+                                          <p:val>
+                                            <p:strVal val="ppt_x+-0.6000*(ppt_x*-0.8090+(1-ppt_y)*-0.5878)"/>
+                                          </p:val>
+                                        </p:tav>
+                                        <p:tav tm="65000">
+                                          <p:val>
+                                            <p:strVal val="ppt_x+-0.6500*(ppt_x*-0.5878+(1-ppt_y)*-0.8090)"/>
+                                          </p:val>
+                                        </p:tav>
+                                        <p:tav tm="70000">
+                                          <p:val>
+                                            <p:strVal val="ppt_x+-0.7000*(ppt_x*-0.3090+(1-ppt_y)*-0.9511)"/>
+                                          </p:val>
+                                        </p:tav>
+                                        <p:tav tm="75000">
+                                          <p:val>
+                                            <p:strVal val="ppt_x+-0.7500*(ppt_x*0.0000+(1-ppt_y)*-1.0000)"/>
+                                          </p:val>
+                                        </p:tav>
+                                        <p:tav tm="80000">
+                                          <p:val>
+                                            <p:strVal val="ppt_x+-0.8000*(ppt_x*0.3090+(1-ppt_y)*-0.9511)"/>
+                                          </p:val>
+                                        </p:tav>
+                                        <p:tav tm="85000">
+                                          <p:val>
+                                            <p:strVal val="ppt_x+-0.8500*(ppt_x*0.5878+(1-ppt_y)*-0.8090)"/>
+                                          </p:val>
+                                        </p:tav>
+                                        <p:tav tm="90000">
+                                          <p:val>
+                                            <p:strVal val="ppt_x+-0.9000*(ppt_x*0.8090+(1-ppt_y)*-0.5878)"/>
+                                          </p:val>
+                                        </p:tav>
+                                        <p:tav tm="95000">
+                                          <p:val>
+                                            <p:strVal val="ppt_x+-0.9500*(ppt_x*0.9511+(1-ppt_y)*-0.3090)"/>
+                                          </p:val>
+                                        </p:tav>
                                         <p:tav tm="100000">
                                           <p:val>
-                                            <p:strVal val="#ppt_x+0.25"/>
+                                            <p:strVal val="ppt_x+-1.0000*(ppt_x*1.0000+(1-ppt_y)*0.0000)"/>
                                           </p:val>
                                         </p:tav>
                                       </p:tavLst>
                                     </p:anim>
                                     <p:anim calcmode="lin" valueType="num">
                                       <p:cBhvr>
-                                        <p:cTn id="58" dur="178">
-                                          <p:stCondLst>
-                                            <p:cond delay="1822"/>
-                                          </p:stCondLst>
-                                        </p:cTn>
-                                        <p:tgtEl>
-                                          <p:spTgt spid="15"/>
-                                        </p:tgtEl>
-                                        <p:attrNameLst>
-                                          <p:attrName>ppt_x</p:attrName>
-                                        </p:attrNameLst>
-                                      </p:cBhvr>
-                                      <p:tavLst>
-                                        <p:tav tm="0">
-                                          <p:val>
-                                            <p:strVal val="ppt_x"/>
-                                          </p:val>
-                                        </p:tav>
-                                        <p:tav tm="100000">
-                                          <p:val>
-                                            <p:strVal val="ppt_x"/>
-                                          </p:val>
-                                        </p:tav>
-                                      </p:tavLst>
-                                    </p:anim>
-                                    <p:anim calcmode="lin" valueType="num">
-                                      <p:cBhvr>
-                                        <p:cTn id="59" dur="664" tmFilter="0.0,0.0;0.25,0.07;0.50,0.2;0.75,0.467;1.0,1.0">
-                                          <p:stCondLst>
-                                            <p:cond delay="0"/>
-                                          </p:stCondLst>
-                                        </p:cTn>
+                                        <p:cTn id="47" dur="1000"/>
                                         <p:tgtEl>
                                           <p:spTgt spid="15"/>
                                         </p:tgtEl>
@@ -16025,418 +15906,111 @@
                                         </p:tav>
                                         <p:tav tm="5000">
                                           <p:val>
-                                            <p:strVal val="ppt_y+0.026"/>
+                                            <p:strVal val="ppt_y+-0.0500*(ppt_x*0.3090-(1-ppt_y)*0.9511)"/>
                                           </p:val>
                                         </p:tav>
                                         <p:tav tm="10000">
                                           <p:val>
-                                            <p:strVal val="ppt_y+0.052"/>
+                                            <p:strVal val="ppt_y+-0.1000*(ppt_x*0.5878-(1-ppt_y)*0.8090)"/>
                                           </p:val>
                                         </p:tav>
                                         <p:tav tm="15000">
                                           <p:val>
-                                            <p:strVal val="ppt_y+0.078"/>
+                                            <p:strVal val="ppt_y+-0.1500*(ppt_x*0.8090-(1-ppt_y)*0.5878)"/>
                                           </p:val>
                                         </p:tav>
                                         <p:tav tm="20000">
                                           <p:val>
-                                            <p:strVal val="ppt_y+0.103"/>
+                                            <p:strVal val="ppt_y+-0.2000*(ppt_x*0.9511-(1-ppt_y)*0.3090)"/>
+                                          </p:val>
+                                        </p:tav>
+                                        <p:tav tm="25000">
+                                          <p:val>
+                                            <p:strVal val="ppt_y+-0.2500*(ppt_x*1.0000-(1-ppt_y)*-0.0000)"/>
                                           </p:val>
                                         </p:tav>
                                         <p:tav tm="30000">
                                           <p:val>
-                                            <p:strVal val="ppt_y+0.151"/>
+                                            <p:strVal val="ppt_y+-0.3000*(ppt_x*0.9511-(1-ppt_y)*-0.3090)"/>
+                                          </p:val>
+                                        </p:tav>
+                                        <p:tav tm="35000">
+                                          <p:val>
+                                            <p:strVal val="ppt_y+-0.3500*(ppt_x*0.8090-(1-ppt_y)*-0.5878)"/>
                                           </p:val>
                                         </p:tav>
                                         <p:tav tm="40000">
                                           <p:val>
-                                            <p:strVal val="ppt_y+0.196"/>
+                                            <p:strVal val="ppt_y+-0.4000*(ppt_x*0.5878-(1-ppt_y)*-0.8090)"/>
+                                          </p:val>
+                                        </p:tav>
+                                        <p:tav tm="45000">
+                                          <p:val>
+                                            <p:strVal val="ppt_y+-0.4500*(ppt_x*0.3090-(1-ppt_y)*-0.9511)"/>
                                           </p:val>
                                         </p:tav>
                                         <p:tav tm="50000">
                                           <p:val>
-                                            <p:strVal val="ppt_y+0.236"/>
+                                            <p:strVal val="ppt_y+-0.5000*(ppt_x*-0.0000-(1-ppt_y)*-1.0000)"/>
+                                          </p:val>
+                                        </p:tav>
+                                        <p:tav tm="55000">
+                                          <p:val>
+                                            <p:strVal val="ppt_y+-0.5500*(ppt_x*-0.3090-(1-ppt_y)*-0.9511)"/>
                                           </p:val>
                                         </p:tav>
                                         <p:tav tm="60000">
                                           <p:val>
-                                            <p:strVal val="ppt_y+0.270"/>
+                                            <p:strVal val="ppt_y+-0.6000*(ppt_x*-0.5878-(1-ppt_y)*-0.8090)"/>
+                                          </p:val>
+                                        </p:tav>
+                                        <p:tav tm="65000">
+                                          <p:val>
+                                            <p:strVal val="ppt_y+-0.6500*(ppt_x*-0.8090-(1-ppt_y)*-0.5878)"/>
                                           </p:val>
                                         </p:tav>
                                         <p:tav tm="70000">
                                           <p:val>
-                                            <p:strVal val="ppt_y+0.297"/>
+                                            <p:strVal val="ppt_y+-0.7000*(ppt_x*-0.9511-(1-ppt_y)*-0.3090)"/>
+                                          </p:val>
+                                        </p:tav>
+                                        <p:tav tm="75000">
+                                          <p:val>
+                                            <p:strVal val="ppt_y+-0.7500*(ppt_x*-1.0000-(1-ppt_y)*0.0000)"/>
                                           </p:val>
                                         </p:tav>
                                         <p:tav tm="80000">
                                           <p:val>
-                                            <p:strVal val="ppt_y+0.317"/>
+                                            <p:strVal val="ppt_y+-0.8000*(ppt_x*-0.9511-(1-ppt_y)*0.3090)"/>
+                                          </p:val>
+                                        </p:tav>
+                                        <p:tav tm="85000">
+                                          <p:val>
+                                            <p:strVal val="ppt_y+-0.8500*(ppt_x*-0.8090-(1-ppt_y)*0.5878)"/>
                                           </p:val>
                                         </p:tav>
                                         <p:tav tm="90000">
                                           <p:val>
-                                            <p:strVal val="ppt_y+0.329"/>
+                                            <p:strVal val="ppt_y+-0.9000*(ppt_x*-0.5878-(1-ppt_y)*0.8090)"/>
+                                          </p:val>
+                                        </p:tav>
+                                        <p:tav tm="95000">
+                                          <p:val>
+                                            <p:strVal val="ppt_y+-0.9500*(ppt_x*-0.3090-(1-ppt_y)*0.9511)"/>
                                           </p:val>
                                         </p:tav>
                                         <p:tav tm="100000">
                                           <p:val>
-                                            <p:strVal val="ppt_y+0.333"/>
+                                            <p:strVal val="ppt_y+-1.0000*(ppt_x*0.0000-(1-ppt_y)*1.0000)"/>
                                           </p:val>
                                         </p:tav>
                                       </p:tavLst>
                                     </p:anim>
-                                    <p:anim calcmode="lin" valueType="num">
-                                      <p:cBhvr>
-                                        <p:cTn id="60" dur="664" tmFilter="0, 0; 0.125,0.2665; 0.25,0.4; 0.375,0.465; 0.5,0.5;  0.625,0.535; 0.75,0.6; 0.875,0.7335; 1,1">
-                                          <p:stCondLst>
-                                            <p:cond delay="664"/>
-                                          </p:stCondLst>
-                                        </p:cTn>
-                                        <p:tgtEl>
-                                          <p:spTgt spid="15"/>
-                                        </p:tgtEl>
-                                        <p:attrNameLst>
-                                          <p:attrName>ppt_y</p:attrName>
-                                        </p:attrNameLst>
-                                      </p:cBhvr>
-                                      <p:tavLst>
-                                        <p:tav tm="0">
-                                          <p:val>
-                                            <p:strVal val="ppt_y"/>
-                                          </p:val>
-                                        </p:tav>
-                                        <p:tav tm="10000">
-                                          <p:val>
-                                            <p:strVal val="ppt_y-0.034"/>
-                                          </p:val>
-                                        </p:tav>
-                                        <p:tav tm="20000">
-                                          <p:val>
-                                            <p:strVal val="ppt_y-0.065"/>
-                                          </p:val>
-                                        </p:tav>
-                                        <p:tav tm="30000">
-                                          <p:val>
-                                            <p:strVal val="ppt_y-0.090"/>
-                                          </p:val>
-                                        </p:tav>
-                                        <p:tav tm="40000">
-                                          <p:val>
-                                            <p:strVal val="ppt_y-0.106"/>
-                                          </p:val>
-                                        </p:tav>
-                                        <p:tav tm="50000">
-                                          <p:val>
-                                            <p:strVal val="ppt_y-0.111"/>
-                                          </p:val>
-                                        </p:tav>
-                                        <p:tav tm="60000">
-                                          <p:val>
-                                            <p:strVal val="ppt_y-0.106"/>
-                                          </p:val>
-                                        </p:tav>
-                                        <p:tav tm="70000">
-                                          <p:val>
-                                            <p:strVal val="ppt_y-0.090"/>
-                                          </p:val>
-                                        </p:tav>
-                                        <p:tav tm="80000">
-                                          <p:val>
-                                            <p:strVal val="ppt_y-0.065"/>
-                                          </p:val>
-                                        </p:tav>
-                                        <p:tav tm="90000">
-                                          <p:val>
-                                            <p:strVal val="ppt_y-0.034"/>
-                                          </p:val>
-                                        </p:tav>
-                                        <p:tav tm="100000">
-                                          <p:val>
-                                            <p:strVal val="ppt_y"/>
-                                          </p:val>
-                                        </p:tav>
-                                      </p:tavLst>
-                                    </p:anim>
-                                    <p:anim calcmode="lin" valueType="num">
-                                      <p:cBhvr>
-                                        <p:cTn id="61" dur="332" tmFilter="0, 0; 0.125,0.2665; 0.25,0.4; 0.375,0.465; 0.5,0.5;  0.625,0.535; 0.75,0.6; 0.875,0.7335; 1,1">
-                                          <p:stCondLst>
-                                            <p:cond delay="1324"/>
-                                          </p:stCondLst>
-                                        </p:cTn>
-                                        <p:tgtEl>
-                                          <p:spTgt spid="15"/>
-                                        </p:tgtEl>
-                                        <p:attrNameLst>
-                                          <p:attrName>ppt_y</p:attrName>
-                                        </p:attrNameLst>
-                                      </p:cBhvr>
-                                      <p:tavLst>
-                                        <p:tav tm="0">
-                                          <p:val>
-                                            <p:strVal val="ppt_y"/>
-                                          </p:val>
-                                        </p:tav>
-                                        <p:tav tm="10000">
-                                          <p:val>
-                                            <p:strVal val="ppt_y-0.011"/>
-                                          </p:val>
-                                        </p:tav>
-                                        <p:tav tm="20000">
-                                          <p:val>
-                                            <p:strVal val="ppt_y-0.022"/>
-                                          </p:val>
-                                        </p:tav>
-                                        <p:tav tm="30000">
-                                          <p:val>
-                                            <p:strVal val="ppt_y-0.030"/>
-                                          </p:val>
-                                        </p:tav>
-                                        <p:tav tm="40000">
-                                          <p:val>
-                                            <p:strVal val="ppt_y-0.035"/>
-                                          </p:val>
-                                        </p:tav>
-                                        <p:tav tm="50000">
-                                          <p:val>
-                                            <p:strVal val="ppt_y-0.037"/>
-                                          </p:val>
-                                        </p:tav>
-                                        <p:tav tm="60000">
-                                          <p:val>
-                                            <p:strVal val="ppt_y-0.035"/>
-                                          </p:val>
-                                        </p:tav>
-                                        <p:tav tm="70000">
-                                          <p:val>
-                                            <p:strVal val="ppt_y-0.030"/>
-                                          </p:val>
-                                        </p:tav>
-                                        <p:tav tm="80000">
-                                          <p:val>
-                                            <p:strVal val="ppt_y-0.022"/>
-                                          </p:val>
-                                        </p:tav>
-                                        <p:tav tm="90000">
-                                          <p:val>
-                                            <p:strVal val="ppt_y-0.011"/>
-                                          </p:val>
-                                        </p:tav>
-                                        <p:tav tm="100000">
-                                          <p:val>
-                                            <p:strVal val="ppt_y"/>
-                                          </p:val>
-                                        </p:tav>
-                                      </p:tavLst>
-                                    </p:anim>
-                                    <p:anim calcmode="lin" valueType="num">
-                                      <p:cBhvr>
-                                        <p:cTn id="62" dur="164" tmFilter="0, 0; 0.125,0.2665; 0.25,0.4; 0.375,0.465; 0.5,0.5;  0.625,0.535; 0.75,0.6; 0.875,0.7335; 1,1">
-                                          <p:stCondLst>
-                                            <p:cond delay="1656"/>
-                                          </p:stCondLst>
-                                        </p:cTn>
-                                        <p:tgtEl>
-                                          <p:spTgt spid="15"/>
-                                        </p:tgtEl>
-                                        <p:attrNameLst>
-                                          <p:attrName>ppt_y</p:attrName>
-                                        </p:attrNameLst>
-                                      </p:cBhvr>
-                                      <p:tavLst>
-                                        <p:tav tm="0">
-                                          <p:val>
-                                            <p:strVal val="ppt_y"/>
-                                          </p:val>
-                                        </p:tav>
-                                        <p:tav tm="10000">
-                                          <p:val>
-                                            <p:strVal val="ppt_y-0.004"/>
-                                          </p:val>
-                                        </p:tav>
-                                        <p:tav tm="20000">
-                                          <p:val>
-                                            <p:strVal val="ppt_y-0.007"/>
-                                          </p:val>
-                                        </p:tav>
-                                        <p:tav tm="30000">
-                                          <p:val>
-                                            <p:strVal val="ppt_y-0.010"/>
-                                          </p:val>
-                                        </p:tav>
-                                        <p:tav tm="40000">
-                                          <p:val>
-                                            <p:strVal val="ppt_y-0.012"/>
-                                          </p:val>
-                                        </p:tav>
-                                        <p:tav tm="50000">
-                                          <p:val>
-                                            <p:strVal val="ppt_y-0.0123"/>
-                                          </p:val>
-                                        </p:tav>
-                                        <p:tav tm="60000">
-                                          <p:val>
-                                            <p:strVal val="ppt_y-0.012"/>
-                                          </p:val>
-                                        </p:tav>
-                                        <p:tav tm="70000">
-                                          <p:val>
-                                            <p:strVal val="ppt_y-0.010"/>
-                                          </p:val>
-                                        </p:tav>
-                                        <p:tav tm="80000">
-                                          <p:val>
-                                            <p:strVal val="ppt_y-0.007"/>
-                                          </p:val>
-                                        </p:tav>
-                                        <p:tav tm="90000">
-                                          <p:val>
-                                            <p:strVal val="ppt_y-0.004"/>
-                                          </p:val>
-                                        </p:tav>
-                                        <p:tav tm="100000">
-                                          <p:val>
-                                            <p:strVal val="ppt_y"/>
-                                          </p:val>
-                                        </p:tav>
-                                      </p:tavLst>
-                                    </p:anim>
-                                    <p:anim calcmode="lin" valueType="num">
-                                      <p:cBhvr>
-                                        <p:cTn id="63" dur="180" accel="50000">
-                                          <p:stCondLst>
-                                            <p:cond delay="1820"/>
-                                          </p:stCondLst>
-                                        </p:cTn>
-                                        <p:tgtEl>
-                                          <p:spTgt spid="15"/>
-                                        </p:tgtEl>
-                                        <p:attrNameLst>
-                                          <p:attrName>ppt_y</p:attrName>
-                                        </p:attrNameLst>
-                                      </p:cBhvr>
-                                      <p:tavLst>
-                                        <p:tav tm="0">
-                                          <p:val>
-                                            <p:strVal val="ppt_y"/>
-                                          </p:val>
-                                        </p:tav>
-                                        <p:tav tm="100000">
-                                          <p:val>
-                                            <p:strVal val="ppt_y+ppt_h"/>
-                                          </p:val>
-                                        </p:tav>
-                                      </p:tavLst>
-                                    </p:anim>
-                                    <p:animScale>
-                                      <p:cBhvr>
-                                        <p:cTn id="64" dur="26">
-                                          <p:stCondLst>
-                                            <p:cond delay="620"/>
-                                          </p:stCondLst>
-                                        </p:cTn>
-                                        <p:tgtEl>
-                                          <p:spTgt spid="15"/>
-                                        </p:tgtEl>
-                                      </p:cBhvr>
-                                      <p:to x="100000" y="60000"/>
-                                    </p:animScale>
-                                    <p:animScale>
-                                      <p:cBhvr>
-                                        <p:cTn id="65" dur="166" decel="50000">
-                                          <p:stCondLst>
-                                            <p:cond delay="646"/>
-                                          </p:stCondLst>
-                                        </p:cTn>
-                                        <p:tgtEl>
-                                          <p:spTgt spid="15"/>
-                                        </p:tgtEl>
-                                      </p:cBhvr>
-                                      <p:to x="100000" y="100000"/>
-                                    </p:animScale>
-                                    <p:animScale>
-                                      <p:cBhvr>
-                                        <p:cTn id="66" dur="26">
-                                          <p:stCondLst>
-                                            <p:cond delay="1312"/>
-                                          </p:stCondLst>
-                                        </p:cTn>
-                                        <p:tgtEl>
-                                          <p:spTgt spid="15"/>
-                                        </p:tgtEl>
-                                      </p:cBhvr>
-                                      <p:to x="100000" y="80000"/>
-                                    </p:animScale>
-                                    <p:animScale>
-                                      <p:cBhvr>
-                                        <p:cTn id="67" dur="166" decel="50000">
-                                          <p:stCondLst>
-                                            <p:cond delay="1338"/>
-                                          </p:stCondLst>
-                                        </p:cTn>
-                                        <p:tgtEl>
-                                          <p:spTgt spid="15"/>
-                                        </p:tgtEl>
-                                      </p:cBhvr>
-                                      <p:to x="100000" y="100000"/>
-                                    </p:animScale>
-                                    <p:animScale>
-                                      <p:cBhvr>
-                                        <p:cTn id="68" dur="26">
-                                          <p:stCondLst>
-                                            <p:cond delay="1642"/>
-                                          </p:stCondLst>
-                                        </p:cTn>
-                                        <p:tgtEl>
-                                          <p:spTgt spid="15"/>
-                                        </p:tgtEl>
-                                      </p:cBhvr>
-                                      <p:to x="100000" y="90000"/>
-                                    </p:animScale>
-                                    <p:animScale>
-                                      <p:cBhvr>
-                                        <p:cTn id="69" dur="166" decel="50000">
-                                          <p:stCondLst>
-                                            <p:cond delay="1668"/>
-                                          </p:stCondLst>
-                                        </p:cTn>
-                                        <p:tgtEl>
-                                          <p:spTgt spid="15"/>
-                                        </p:tgtEl>
-                                      </p:cBhvr>
-                                      <p:to x="100000" y="100000"/>
-                                    </p:animScale>
-                                    <p:animScale>
-                                      <p:cBhvr>
-                                        <p:cTn id="70" dur="26">
-                                          <p:stCondLst>
-                                            <p:cond delay="1808"/>
-                                          </p:stCondLst>
-                                        </p:cTn>
-                                        <p:tgtEl>
-                                          <p:spTgt spid="15"/>
-                                        </p:tgtEl>
-                                      </p:cBhvr>
-                                      <p:to x="100000" y="95000"/>
-                                    </p:animScale>
-                                    <p:animScale>
-                                      <p:cBhvr>
-                                        <p:cTn id="71" dur="166" decel="50000">
-                                          <p:stCondLst>
-                                            <p:cond delay="1834"/>
-                                          </p:stCondLst>
-                                        </p:cTn>
-                                        <p:tgtEl>
-                                          <p:spTgt spid="15"/>
-                                        </p:tgtEl>
-                                      </p:cBhvr>
-                                      <p:to x="100000" y="100000"/>
-                                    </p:animScale>
                                     <p:set>
                                       <p:cBhvr>
-                                        <p:cTn id="72" dur="1" fill="hold">
+                                        <p:cTn id="48" dur="1" fill="hold">
                                           <p:stCondLst>
-                                            <p:cond delay="1999"/>
+                                            <p:cond delay="999"/>
                                           </p:stCondLst>
                                         </p:cTn>
                                         <p:tgtEl>
@@ -16457,20 +16031,20 @@
                           </p:cTn>
                         </p:par>
                         <p:par>
-                          <p:cTn id="73" fill="hold">
+                          <p:cTn id="49" fill="hold">
                             <p:stCondLst>
-                              <p:cond delay="2000"/>
+                              <p:cond delay="1000"/>
                             </p:stCondLst>
                             <p:childTnLst>
                               <p:par>
-                                <p:cTn id="74" presetID="2" presetClass="entr" presetSubtype="2" fill="hold" grpId="0" nodeType="afterEffect">
+                                <p:cTn id="50" presetID="2" presetClass="entr" presetSubtype="2" fill="hold" grpId="0" nodeType="afterEffect">
                                   <p:stCondLst>
                                     <p:cond delay="0"/>
                                   </p:stCondLst>
                                   <p:childTnLst>
                                     <p:set>
                                       <p:cBhvr>
-                                        <p:cTn id="75" dur="1" fill="hold">
+                                        <p:cTn id="51" dur="1" fill="hold">
                                           <p:stCondLst>
                                             <p:cond delay="0"/>
                                           </p:stCondLst>
@@ -16488,7 +16062,7 @@
                                     </p:set>
                                     <p:anim calcmode="lin" valueType="num">
                                       <p:cBhvr additive="base">
-                                        <p:cTn id="76" dur="500" fill="hold"/>
+                                        <p:cTn id="52" dur="500" fill="hold"/>
                                         <p:tgtEl>
                                           <p:spTgt spid="16"/>
                                         </p:tgtEl>
@@ -16511,7 +16085,7 @@
                                     </p:anim>
                                     <p:anim calcmode="lin" valueType="num">
                                       <p:cBhvr additive="base">
-                                        <p:cTn id="77" dur="500" fill="hold"/>
+                                        <p:cTn id="53" dur="500" fill="hold"/>
                                         <p:tgtEl>
                                           <p:spTgt spid="16"/>
                                         </p:tgtEl>
@@ -16536,14 +16110,14 @@
                                 </p:cTn>
                               </p:par>
                               <p:par>
-                                <p:cTn id="78" presetID="2" presetClass="entr" presetSubtype="2" fill="hold" grpId="0" nodeType="withEffect">
+                                <p:cTn id="54" presetID="2" presetClass="entr" presetSubtype="2" fill="hold" grpId="0" nodeType="withEffect">
                                   <p:stCondLst>
                                     <p:cond delay="0"/>
                                   </p:stCondLst>
                                   <p:childTnLst>
                                     <p:set>
                                       <p:cBhvr>
-                                        <p:cTn id="79" dur="1" fill="hold">
+                                        <p:cTn id="55" dur="1" fill="hold">
                                           <p:stCondLst>
                                             <p:cond delay="0"/>
                                           </p:stCondLst>
@@ -16561,7 +16135,7 @@
                                     </p:set>
                                     <p:anim calcmode="lin" valueType="num">
                                       <p:cBhvr additive="base">
-                                        <p:cTn id="80" dur="500" fill="hold"/>
+                                        <p:cTn id="56" dur="500" fill="hold"/>
                                         <p:tgtEl>
                                           <p:spTgt spid="17"/>
                                         </p:tgtEl>
@@ -16584,7 +16158,7 @@
                                     </p:anim>
                                     <p:anim calcmode="lin" valueType="num">
                                       <p:cBhvr additive="base">
-                                        <p:cTn id="81" dur="500" fill="hold"/>
+                                        <p:cTn id="57" dur="500" fill="hold"/>
                                         <p:tgtEl>
                                           <p:spTgt spid="17"/>
                                         </p:tgtEl>
@@ -16615,26 +16189,26 @@
                     </p:cTn>
                   </p:par>
                   <p:par>
-                    <p:cTn id="82" fill="hold">
+                    <p:cTn id="58" fill="hold">
                       <p:stCondLst>
                         <p:cond delay="indefinite"/>
                       </p:stCondLst>
                       <p:childTnLst>
                         <p:par>
-                          <p:cTn id="83" fill="hold">
+                          <p:cTn id="59" fill="hold">
                             <p:stCondLst>
                               <p:cond delay="0"/>
                             </p:stCondLst>
                             <p:childTnLst>
                               <p:par>
-                                <p:cTn id="84" presetID="42" presetClass="path" presetSubtype="0" accel="50000" decel="50000" fill="hold" nodeType="clickEffect">
+                                <p:cTn id="60" presetID="42" presetClass="path" presetSubtype="0" accel="50000" decel="50000" fill="hold" nodeType="clickEffect">
                                   <p:stCondLst>
                                     <p:cond delay="0"/>
                                   </p:stCondLst>
                                   <p:childTnLst>
                                     <p:animMotion origin="layout" path="M 0 2.96296E-6 L 0.46285 -0.19229 " pathEditMode="relative" rAng="0" ptsTypes="AA">
                                       <p:cBhvr>
-                                        <p:cTn id="85" dur="2000" fill="hold"/>
+                                        <p:cTn id="61" dur="2000" fill="hold"/>
                                         <p:tgtEl>
                                           <p:spTgt spid="4"/>
                                         </p:tgtEl>
@@ -16652,20 +16226,20 @@
                           </p:cTn>
                         </p:par>
                         <p:par>
-                          <p:cTn id="86" fill="hold">
+                          <p:cTn id="62" fill="hold">
                             <p:stCondLst>
                               <p:cond delay="2000"/>
                             </p:stCondLst>
                             <p:childTnLst>
                               <p:par>
-                                <p:cTn id="87" presetID="10" presetClass="exit" presetSubtype="0" fill="hold" nodeType="afterEffect">
+                                <p:cTn id="63" presetID="10" presetClass="exit" presetSubtype="0" fill="hold" nodeType="afterEffect">
                                   <p:stCondLst>
                                     <p:cond delay="0"/>
                                   </p:stCondLst>
                                   <p:childTnLst>
                                     <p:animEffect transition="out" filter="fade">
                                       <p:cBhvr>
-                                        <p:cTn id="88" dur="500"/>
+                                        <p:cTn id="64" dur="500"/>
                                         <p:tgtEl>
                                           <p:spTgt spid="4"/>
                                         </p:tgtEl>
@@ -16673,7 +16247,7 @@
                                     </p:animEffect>
                                     <p:set>
                                       <p:cBhvr>
-                                        <p:cTn id="89" dur="1" fill="hold">
+                                        <p:cTn id="65" dur="1" fill="hold">
                                           <p:stCondLst>
                                             <p:cond delay="499"/>
                                           </p:stCondLst>
@@ -16693,14 +16267,14 @@
                                 </p:cTn>
                               </p:par>
                               <p:par>
-                                <p:cTn id="90" presetID="10" presetClass="entr" presetSubtype="0" fill="hold" nodeType="withEffect">
+                                <p:cTn id="66" presetID="10" presetClass="entr" presetSubtype="0" fill="hold" nodeType="withEffect">
                                   <p:stCondLst>
                                     <p:cond delay="0"/>
                                   </p:stCondLst>
                                   <p:childTnLst>
                                     <p:set>
                                       <p:cBhvr>
-                                        <p:cTn id="91" dur="1" fill="hold">
+                                        <p:cTn id="67" dur="1" fill="hold">
                                           <p:stCondLst>
                                             <p:cond delay="0"/>
                                           </p:stCondLst>
@@ -16718,7 +16292,7 @@
                                     </p:set>
                                     <p:animEffect transition="in" filter="fade">
                                       <p:cBhvr>
-                                        <p:cTn id="92" dur="500"/>
+                                        <p:cTn id="68" dur="500"/>
                                         <p:tgtEl>
                                           <p:spTgt spid="8"/>
                                         </p:tgtEl>
@@ -22597,146 +22171,6 @@
           </a:prstGeom>
         </p:spPr>
       </p:pic>
-      <p:sp>
-        <p:nvSpPr>
-          <p:cNvPr id="34" name="Callout: Line 33">
-            <a:extLst>
-              <a:ext uri="{FF2B5EF4-FFF2-40B4-BE49-F238E27FC236}">
-                <a16:creationId xmlns:a16="http://schemas.microsoft.com/office/drawing/2014/main" id="{995EF453-4B78-432C-9EDA-A59DC5BFA48C}"/>
-              </a:ext>
-            </a:extLst>
-          </p:cNvPr>
-          <p:cNvSpPr/>
-          <p:nvPr/>
-        </p:nvSpPr>
-        <p:spPr>
-          <a:xfrm>
-            <a:off x="632841" y="486801"/>
-            <a:ext cx="4796176" cy="1915195"/>
-          </a:xfrm>
-          <a:prstGeom prst="borderCallout1">
-            <a:avLst>
-              <a:gd name="adj1" fmla="val 46995"/>
-              <a:gd name="adj2" fmla="val 100068"/>
-              <a:gd name="adj3" fmla="val 92624"/>
-              <a:gd name="adj4" fmla="val 128690"/>
-            </a:avLst>
-          </a:prstGeom>
-          <a:solidFill>
-            <a:schemeClr val="bg1">
-              <a:lumMod val="95000"/>
-            </a:schemeClr>
-          </a:solidFill>
-          <a:ln>
-            <a:solidFill>
-              <a:schemeClr val="accent2"/>
-            </a:solidFill>
-          </a:ln>
-        </p:spPr>
-        <p:style>
-          <a:lnRef idx="2">
-            <a:schemeClr val="accent6"/>
-          </a:lnRef>
-          <a:fillRef idx="1">
-            <a:schemeClr val="lt1"/>
-          </a:fillRef>
-          <a:effectRef idx="0">
-            <a:schemeClr val="accent6"/>
-          </a:effectRef>
-          <a:fontRef idx="minor">
-            <a:schemeClr val="dk1"/>
-          </a:fontRef>
-        </p:style>
-        <p:txBody>
-          <a:bodyPr rtlCol="0" anchor="ctr"/>
-          <a:lstStyle/>
-          <a:p>
-            <a:r>
-              <a:rPr lang="en-US" sz="1400" dirty="0">
-                <a:highlight>
-                  <a:srgbClr val="00FFFF"/>
-                </a:highlight>
-              </a:rPr>
-              <a:t>DECLARE @p1 </a:t>
-            </a:r>
-            <a:r>
-              <a:rPr lang="en-US" sz="1400" dirty="0" err="1">
-                <a:highlight>
-                  <a:srgbClr val="00FFFF"/>
-                </a:highlight>
-              </a:rPr>
-              <a:t>nvarchar</a:t>
-            </a:r>
-            <a:r>
-              <a:rPr lang="en-US" sz="1400" dirty="0">
-                <a:highlight>
-                  <a:srgbClr val="00FFFF"/>
-                </a:highlight>
-              </a:rPr>
-              <a:t>(100)</a:t>
-            </a:r>
-          </a:p>
-          <a:p>
-            <a:r>
-              <a:rPr lang="en-US" sz="1400" dirty="0">
-                <a:highlight>
-                  <a:srgbClr val="00FFFF"/>
-                </a:highlight>
-              </a:rPr>
-              <a:t>    SET @p1 = @Params[id=1]</a:t>
-            </a:r>
-          </a:p>
-          <a:p>
-            <a:r>
-              <a:rPr lang="en-US" sz="1400" dirty="0">
-                <a:highlight>
-                  <a:srgbClr val="00FFFF"/>
-                </a:highlight>
-              </a:rPr>
-              <a:t>DECLARE @p2 TABLE (int)</a:t>
-            </a:r>
-          </a:p>
-          <a:p>
-            <a:r>
-              <a:rPr lang="en-US" sz="1400" dirty="0">
-                <a:highlight>
-                  <a:srgbClr val="00FFFF"/>
-                </a:highlight>
-              </a:rPr>
-              <a:t>    INSERT INTO @p2 SELECT value FROM @Params[id=2]</a:t>
-            </a:r>
-          </a:p>
-          <a:p>
-            <a:endParaRPr lang="en-US" sz="1400" dirty="0"/>
-          </a:p>
-          <a:p>
-            <a:r>
-              <a:rPr lang="en-US" sz="1400" dirty="0"/>
-              <a:t>SELECT * FROM Contacts WHERE 1=1</a:t>
-            </a:r>
-          </a:p>
-          <a:p>
-            <a:r>
-              <a:rPr lang="en-US" sz="1400" dirty="0">
-                <a:highlight>
-                  <a:srgbClr val="00FFFF"/>
-                </a:highlight>
-              </a:rPr>
-              <a:t>AND Name = @p1</a:t>
-            </a:r>
-          </a:p>
-          <a:p>
-            <a:r>
-              <a:rPr lang="en-US" sz="1400" dirty="0">
-                <a:highlight>
-                  <a:srgbClr val="00FFFF"/>
-                </a:highlight>
-              </a:rPr>
-              <a:t>AND Country IN (SELECT value FROM @p2)</a:t>
-            </a:r>
-          </a:p>
-        </p:txBody>
-      </p:sp>
       <p:cxnSp>
         <p:nvCxnSpPr>
           <p:cNvPr id="38" name="Straight Arrow Connector 37">
@@ -22915,6 +22349,399 @@
           </a:prstGeom>
         </p:spPr>
       </p:pic>
+      <p:grpSp>
+        <p:nvGrpSpPr>
+          <p:cNvPr id="13" name="Group 12">
+            <a:extLst>
+              <a:ext uri="{FF2B5EF4-FFF2-40B4-BE49-F238E27FC236}">
+                <a16:creationId xmlns:a16="http://schemas.microsoft.com/office/drawing/2014/main" id="{60E0F7DA-9015-4D93-AAA1-688BAE4E3DBB}"/>
+              </a:ext>
+            </a:extLst>
+          </p:cNvPr>
+          <p:cNvGrpSpPr/>
+          <p:nvPr/>
+        </p:nvGrpSpPr>
+        <p:grpSpPr>
+          <a:xfrm>
+            <a:off x="3360002" y="754309"/>
+            <a:ext cx="5211614" cy="2824521"/>
+            <a:chOff x="1403498" y="594821"/>
+            <a:chExt cx="5211614" cy="2824521"/>
+          </a:xfrm>
+        </p:grpSpPr>
+        <p:pic>
+          <p:nvPicPr>
+            <p:cNvPr id="7" name="Picture 6">
+              <a:extLst>
+                <a:ext uri="{FF2B5EF4-FFF2-40B4-BE49-F238E27FC236}">
+                  <a16:creationId xmlns:a16="http://schemas.microsoft.com/office/drawing/2014/main" id="{9732EA2F-5BDF-411F-8894-11B51DE7E74D}"/>
+                </a:ext>
+              </a:extLst>
+            </p:cNvPr>
+            <p:cNvPicPr>
+              <a:picLocks noChangeAspect="1"/>
+            </p:cNvPicPr>
+            <p:nvPr/>
+          </p:nvPicPr>
+          <p:blipFill>
+            <a:blip r:embed="rId17"/>
+            <a:stretch>
+              <a:fillRect/>
+            </a:stretch>
+          </p:blipFill>
+          <p:spPr>
+            <a:xfrm>
+              <a:off x="1437367" y="2019299"/>
+              <a:ext cx="5177745" cy="1400043"/>
+            </a:xfrm>
+            <a:prstGeom prst="rect">
+              <a:avLst/>
+            </a:prstGeom>
+          </p:spPr>
+        </p:pic>
+        <p:pic>
+          <p:nvPicPr>
+            <p:cNvPr id="11" name="Picture 10">
+              <a:extLst>
+                <a:ext uri="{FF2B5EF4-FFF2-40B4-BE49-F238E27FC236}">
+                  <a16:creationId xmlns:a16="http://schemas.microsoft.com/office/drawing/2014/main" id="{554FF7E6-72E7-400C-8309-0A531EEBD4F2}"/>
+                </a:ext>
+              </a:extLst>
+            </p:cNvPr>
+            <p:cNvPicPr>
+              <a:picLocks noChangeAspect="1"/>
+            </p:cNvPicPr>
+            <p:nvPr/>
+          </p:nvPicPr>
+          <p:blipFill>
+            <a:blip r:embed="rId18"/>
+            <a:stretch>
+              <a:fillRect/>
+            </a:stretch>
+          </p:blipFill>
+          <p:spPr>
+            <a:xfrm>
+              <a:off x="1403498" y="594821"/>
+              <a:ext cx="4133850" cy="1323975"/>
+            </a:xfrm>
+            <a:prstGeom prst="rect">
+              <a:avLst/>
+            </a:prstGeom>
+          </p:spPr>
+        </p:pic>
+      </p:grpSp>
+      <p:sp>
+        <p:nvSpPr>
+          <p:cNvPr id="34" name="Callout: Line 33">
+            <a:extLst>
+              <a:ext uri="{FF2B5EF4-FFF2-40B4-BE49-F238E27FC236}">
+                <a16:creationId xmlns:a16="http://schemas.microsoft.com/office/drawing/2014/main" id="{995EF453-4B78-432C-9EDA-A59DC5BFA48C}"/>
+              </a:ext>
+            </a:extLst>
+          </p:cNvPr>
+          <p:cNvSpPr/>
+          <p:nvPr/>
+        </p:nvSpPr>
+        <p:spPr>
+          <a:xfrm>
+            <a:off x="199292" y="486801"/>
+            <a:ext cx="5229725" cy="1915195"/>
+          </a:xfrm>
+          <a:prstGeom prst="borderCallout1">
+            <a:avLst>
+              <a:gd name="adj1" fmla="val 46995"/>
+              <a:gd name="adj2" fmla="val 100068"/>
+              <a:gd name="adj3" fmla="val 92624"/>
+              <a:gd name="adj4" fmla="val 128690"/>
+            </a:avLst>
+          </a:prstGeom>
+          <a:solidFill>
+            <a:schemeClr val="bg1">
+              <a:lumMod val="95000"/>
+            </a:schemeClr>
+          </a:solidFill>
+          <a:ln>
+            <a:solidFill>
+              <a:schemeClr val="accent2"/>
+            </a:solidFill>
+          </a:ln>
+        </p:spPr>
+        <p:style>
+          <a:lnRef idx="2">
+            <a:schemeClr val="accent6"/>
+          </a:lnRef>
+          <a:fillRef idx="1">
+            <a:schemeClr val="lt1"/>
+          </a:fillRef>
+          <a:effectRef idx="0">
+            <a:schemeClr val="accent6"/>
+          </a:effectRef>
+          <a:fontRef idx="minor">
+            <a:schemeClr val="dk1"/>
+          </a:fontRef>
+        </p:style>
+        <p:txBody>
+          <a:bodyPr rtlCol="0" anchor="ctr"/>
+          <a:lstStyle/>
+          <a:p>
+            <a:r>
+              <a:rPr lang="en-US" sz="1400" dirty="0"/>
+              <a:t>DECLARE </a:t>
+            </a:r>
+            <a:r>
+              <a:rPr lang="en-US" sz="1400" dirty="0">
+                <a:highlight>
+                  <a:srgbClr val="00FFFF"/>
+                </a:highlight>
+              </a:rPr>
+              <a:t>@p1 </a:t>
+            </a:r>
+            <a:r>
+              <a:rPr lang="en-US" sz="1400" dirty="0" err="1">
+                <a:highlight>
+                  <a:srgbClr val="00FFFF"/>
+                </a:highlight>
+              </a:rPr>
+              <a:t>nvarchar</a:t>
+            </a:r>
+            <a:r>
+              <a:rPr lang="en-US" sz="1400" dirty="0">
+                <a:highlight>
+                  <a:srgbClr val="00FFFF"/>
+                </a:highlight>
+              </a:rPr>
+              <a:t>(50)</a:t>
+            </a:r>
+          </a:p>
+          <a:p>
+            <a:r>
+              <a:rPr lang="en-US" sz="1400" dirty="0"/>
+              <a:t>    SET </a:t>
+            </a:r>
+            <a:r>
+              <a:rPr lang="en-US" sz="1400" dirty="0">
+                <a:highlight>
+                  <a:srgbClr val="00FFFF"/>
+                </a:highlight>
+              </a:rPr>
+              <a:t>@p1</a:t>
+            </a:r>
+            <a:r>
+              <a:rPr lang="en-US" sz="1400" dirty="0"/>
+              <a:t> = @</a:t>
+            </a:r>
+            <a:r>
+              <a:rPr lang="en-US" sz="1400" dirty="0" err="1"/>
+              <a:t>Params.value</a:t>
+            </a:r>
+            <a:r>
+              <a:rPr lang="en-US" sz="1400" dirty="0"/>
+              <a:t>[</a:t>
+            </a:r>
+            <a:r>
+              <a:rPr lang="en-US" sz="1400" dirty="0">
+                <a:highlight>
+                  <a:srgbClr val="00FFFF"/>
+                </a:highlight>
+              </a:rPr>
+              <a:t>id=1</a:t>
+            </a:r>
+            <a:r>
+              <a:rPr lang="en-US" sz="1400" dirty="0"/>
+              <a:t>]</a:t>
+            </a:r>
+          </a:p>
+          <a:p>
+            <a:r>
+              <a:rPr lang="en-US" sz="1400" dirty="0"/>
+              <a:t>DECLARE </a:t>
+            </a:r>
+            <a:r>
+              <a:rPr lang="en-US" sz="1400" dirty="0">
+                <a:highlight>
+                  <a:srgbClr val="00FFFF"/>
+                </a:highlight>
+              </a:rPr>
+              <a:t>@p2 TABLE (int)</a:t>
+            </a:r>
+          </a:p>
+          <a:p>
+            <a:r>
+              <a:rPr lang="en-US" sz="1400" dirty="0"/>
+              <a:t>    INSERT INTO </a:t>
+            </a:r>
+            <a:r>
+              <a:rPr lang="en-US" sz="1400" dirty="0">
+                <a:highlight>
+                  <a:srgbClr val="00FFFF"/>
+                </a:highlight>
+              </a:rPr>
+              <a:t>@p2 </a:t>
+            </a:r>
+            <a:r>
+              <a:rPr lang="en-US" sz="1400" dirty="0"/>
+              <a:t>SELECT value FROM @</a:t>
+            </a:r>
+            <a:r>
+              <a:rPr lang="en-US" sz="1400" dirty="0" err="1"/>
+              <a:t>Params.value</a:t>
+            </a:r>
+            <a:r>
+              <a:rPr lang="en-US" sz="1400" dirty="0"/>
+              <a:t>[</a:t>
+            </a:r>
+            <a:r>
+              <a:rPr lang="en-US" sz="1400" dirty="0">
+                <a:highlight>
+                  <a:srgbClr val="00FFFF"/>
+                </a:highlight>
+              </a:rPr>
+              <a:t>id=2</a:t>
+            </a:r>
+            <a:r>
+              <a:rPr lang="en-US" sz="1400" dirty="0"/>
+              <a:t>]</a:t>
+            </a:r>
+          </a:p>
+          <a:p>
+            <a:endParaRPr lang="en-US" sz="1400" dirty="0"/>
+          </a:p>
+          <a:p>
+            <a:r>
+              <a:rPr lang="en-US" sz="1400" dirty="0"/>
+              <a:t>SELECT * FROM Members WHERE 1=1</a:t>
+            </a:r>
+          </a:p>
+          <a:p>
+            <a:r>
+              <a:rPr lang="en-US" sz="1400" dirty="0"/>
+              <a:t>AND </a:t>
+            </a:r>
+            <a:r>
+              <a:rPr lang="en-US" sz="1400" dirty="0">
+                <a:highlight>
+                  <a:srgbClr val="00FFFF"/>
+                </a:highlight>
+              </a:rPr>
+              <a:t>Name = @p1</a:t>
+            </a:r>
+          </a:p>
+          <a:p>
+            <a:r>
+              <a:rPr lang="en-US" sz="1400" dirty="0"/>
+              <a:t>AND </a:t>
+            </a:r>
+            <a:r>
+              <a:rPr lang="en-US" sz="1400" dirty="0">
+                <a:highlight>
+                  <a:srgbClr val="00FFFF"/>
+                </a:highlight>
+              </a:rPr>
+              <a:t>Country IN (SELECT value FROM @p2)</a:t>
+            </a:r>
+          </a:p>
+        </p:txBody>
+      </p:sp>
+      <p:sp>
+        <p:nvSpPr>
+          <p:cNvPr id="39" name="Rectangle 38">
+            <a:extLst>
+              <a:ext uri="{FF2B5EF4-FFF2-40B4-BE49-F238E27FC236}">
+                <a16:creationId xmlns:a16="http://schemas.microsoft.com/office/drawing/2014/main" id="{AB75F5BB-0BF4-4A4A-A8BC-3DEC469924FA}"/>
+              </a:ext>
+            </a:extLst>
+          </p:cNvPr>
+          <p:cNvSpPr/>
+          <p:nvPr/>
+        </p:nvSpPr>
+        <p:spPr>
+          <a:xfrm>
+            <a:off x="1379820" y="787737"/>
+            <a:ext cx="787234" cy="250779"/>
+          </a:xfrm>
+          <a:prstGeom prst="rect">
+            <a:avLst/>
+          </a:prstGeom>
+          <a:noFill/>
+          <a:ln>
+            <a:solidFill>
+              <a:srgbClr val="FF0000"/>
+            </a:solidFill>
+          </a:ln>
+        </p:spPr>
+        <p:style>
+          <a:lnRef idx="2">
+            <a:schemeClr val="accent6"/>
+          </a:lnRef>
+          <a:fillRef idx="1">
+            <a:schemeClr val="lt1"/>
+          </a:fillRef>
+          <a:effectRef idx="0">
+            <a:schemeClr val="accent6"/>
+          </a:effectRef>
+          <a:fontRef idx="minor">
+            <a:schemeClr val="dk1"/>
+          </a:fontRef>
+        </p:style>
+        <p:txBody>
+          <a:bodyPr rtlCol="0" anchor="ctr"/>
+          <a:lstStyle/>
+          <a:p>
+            <a:pPr algn="ctr"/>
+            <a:endParaRPr lang="en-US"/>
+          </a:p>
+        </p:txBody>
+      </p:sp>
+      <p:sp>
+        <p:nvSpPr>
+          <p:cNvPr id="40" name="Rectangle 39">
+            <a:extLst>
+              <a:ext uri="{FF2B5EF4-FFF2-40B4-BE49-F238E27FC236}">
+                <a16:creationId xmlns:a16="http://schemas.microsoft.com/office/drawing/2014/main" id="{C73733EE-B1B2-400D-A1AC-00F6588758F1}"/>
+              </a:ext>
+            </a:extLst>
+          </p:cNvPr>
+          <p:cNvSpPr/>
+          <p:nvPr/>
+        </p:nvSpPr>
+        <p:spPr>
+          <a:xfrm>
+            <a:off x="3546707" y="1231586"/>
+            <a:ext cx="787234" cy="250779"/>
+          </a:xfrm>
+          <a:prstGeom prst="rect">
+            <a:avLst/>
+          </a:prstGeom>
+          <a:noFill/>
+          <a:ln>
+            <a:solidFill>
+              <a:srgbClr val="FF0000"/>
+            </a:solidFill>
+          </a:ln>
+        </p:spPr>
+        <p:style>
+          <a:lnRef idx="2">
+            <a:schemeClr val="accent6"/>
+          </a:lnRef>
+          <a:fillRef idx="1">
+            <a:schemeClr val="lt1"/>
+          </a:fillRef>
+          <a:effectRef idx="0">
+            <a:schemeClr val="accent6"/>
+          </a:effectRef>
+          <a:fontRef idx="minor">
+            <a:schemeClr val="dk1"/>
+          </a:fontRef>
+        </p:style>
+        <p:txBody>
+          <a:bodyPr rtlCol="0" anchor="ctr"/>
+          <a:lstStyle/>
+          <a:p>
+            <a:pPr algn="ctr"/>
+            <a:endParaRPr lang="en-US"/>
+          </a:p>
+        </p:txBody>
+      </p:sp>
       <p:sp>
         <p:nvSpPr>
           <p:cNvPr id="37" name="TextBox 36">
@@ -23469,14 +23296,157 @@
                             </p:stCondLst>
                             <p:childTnLst>
                               <p:par>
-                                <p:cTn id="27" presetID="42" presetClass="path" presetSubtype="0" accel="50000" decel="50000" fill="hold" nodeType="afterEffect">
+                                <p:cTn id="27" presetID="53" presetClass="entr" presetSubtype="16" fill="hold" nodeType="afterEffect">
+                                  <p:stCondLst>
+                                    <p:cond delay="0"/>
+                                  </p:stCondLst>
+                                  <p:childTnLst>
+                                    <p:set>
+                                      <p:cBhvr>
+                                        <p:cTn id="28" dur="1" fill="hold">
+                                          <p:stCondLst>
+                                            <p:cond delay="0"/>
+                                          </p:stCondLst>
+                                        </p:cTn>
+                                        <p:tgtEl>
+                                          <p:spTgt spid="13"/>
+                                        </p:tgtEl>
+                                        <p:attrNameLst>
+                                          <p:attrName>style.visibility</p:attrName>
+                                        </p:attrNameLst>
+                                      </p:cBhvr>
+                                      <p:to>
+                                        <p:strVal val="visible"/>
+                                      </p:to>
+                                    </p:set>
+                                    <p:anim calcmode="lin" valueType="num">
+                                      <p:cBhvr>
+                                        <p:cTn id="29" dur="500" fill="hold"/>
+                                        <p:tgtEl>
+                                          <p:spTgt spid="13"/>
+                                        </p:tgtEl>
+                                        <p:attrNameLst>
+                                          <p:attrName>ppt_w</p:attrName>
+                                        </p:attrNameLst>
+                                      </p:cBhvr>
+                                      <p:tavLst>
+                                        <p:tav tm="0">
+                                          <p:val>
+                                            <p:fltVal val="0"/>
+                                          </p:val>
+                                        </p:tav>
+                                        <p:tav tm="100000">
+                                          <p:val>
+                                            <p:strVal val="#ppt_w"/>
+                                          </p:val>
+                                        </p:tav>
+                                      </p:tavLst>
+                                    </p:anim>
+                                    <p:anim calcmode="lin" valueType="num">
+                                      <p:cBhvr>
+                                        <p:cTn id="30" dur="500" fill="hold"/>
+                                        <p:tgtEl>
+                                          <p:spTgt spid="13"/>
+                                        </p:tgtEl>
+                                        <p:attrNameLst>
+                                          <p:attrName>ppt_h</p:attrName>
+                                        </p:attrNameLst>
+                                      </p:cBhvr>
+                                      <p:tavLst>
+                                        <p:tav tm="0">
+                                          <p:val>
+                                            <p:fltVal val="0"/>
+                                          </p:val>
+                                        </p:tav>
+                                        <p:tav tm="100000">
+                                          <p:val>
+                                            <p:strVal val="#ppt_h"/>
+                                          </p:val>
+                                        </p:tav>
+                                      </p:tavLst>
+                                    </p:anim>
+                                    <p:animEffect transition="in" filter="fade">
+                                      <p:cBhvr>
+                                        <p:cTn id="31" dur="500"/>
+                                        <p:tgtEl>
+                                          <p:spTgt spid="13"/>
+                                        </p:tgtEl>
+                                      </p:cBhvr>
+                                    </p:animEffect>
+                                  </p:childTnLst>
+                                </p:cTn>
+                              </p:par>
+                            </p:childTnLst>
+                          </p:cTn>
+                        </p:par>
+                      </p:childTnLst>
+                    </p:cTn>
+                  </p:par>
+                  <p:par>
+                    <p:cTn id="32" fill="hold">
+                      <p:stCondLst>
+                        <p:cond delay="indefinite"/>
+                      </p:stCondLst>
+                      <p:childTnLst>
+                        <p:par>
+                          <p:cTn id="33" fill="hold">
+                            <p:stCondLst>
+                              <p:cond delay="0"/>
+                            </p:stCondLst>
+                            <p:childTnLst>
+                              <p:par>
+                                <p:cTn id="34" presetID="10" presetClass="exit" presetSubtype="0" fill="hold" nodeType="clickEffect">
+                                  <p:stCondLst>
+                                    <p:cond delay="0"/>
+                                  </p:stCondLst>
+                                  <p:childTnLst>
+                                    <p:animEffect transition="out" filter="fade">
+                                      <p:cBhvr>
+                                        <p:cTn id="35" dur="500"/>
+                                        <p:tgtEl>
+                                          <p:spTgt spid="13"/>
+                                        </p:tgtEl>
+                                      </p:cBhvr>
+                                    </p:animEffect>
+                                    <p:set>
+                                      <p:cBhvr>
+                                        <p:cTn id="36" dur="1" fill="hold">
+                                          <p:stCondLst>
+                                            <p:cond delay="499"/>
+                                          </p:stCondLst>
+                                        </p:cTn>
+                                        <p:tgtEl>
+                                          <p:spTgt spid="13"/>
+                                        </p:tgtEl>
+                                        <p:attrNameLst>
+                                          <p:attrName>style.visibility</p:attrName>
+                                        </p:attrNameLst>
+                                      </p:cBhvr>
+                                      <p:to>
+                                        <p:strVal val="hidden"/>
+                                      </p:to>
+                                    </p:set>
+                                  </p:childTnLst>
+                                </p:cTn>
+                              </p:par>
+                            </p:childTnLst>
+                          </p:cTn>
+                        </p:par>
+                        <p:par>
+                          <p:cTn id="37" fill="hold">
+                            <p:stCondLst>
+                              <p:cond delay="500"/>
+                            </p:stCondLst>
+                            <p:childTnLst>
+                              <p:par>
+                                <p:cTn id="38" presetID="42" presetClass="path" presetSubtype="0" accel="50000" decel="50000" fill="hold" nodeType="afterEffect">
                                   <p:stCondLst>
                                     <p:cond delay="0"/>
                                   </p:stCondLst>
                                   <p:childTnLst>
                                     <p:animMotion origin="layout" path="M 1.94444E-6 -3.7037E-7 L -0.09184 -0.17191 " pathEditMode="relative" rAng="0" ptsTypes="AA">
                                       <p:cBhvr>
-                                        <p:cTn id="28" dur="1000" fill="hold"/>
+                                        <p:cTn id="39" dur="1000" fill="hold"/>
                                         <p:tgtEl>
                                           <p:spTgt spid="12"/>
                                         </p:tgtEl>
@@ -23494,20 +23464,20 @@
                           </p:cTn>
                         </p:par>
                         <p:par>
-                          <p:cTn id="29" fill="hold">
+                          <p:cTn id="40" fill="hold">
                             <p:stCondLst>
-                              <p:cond delay="3500"/>
+                              <p:cond delay="1500"/>
                             </p:stCondLst>
                             <p:childTnLst>
                               <p:par>
-                                <p:cTn id="30" presetID="1" presetClass="exit" presetSubtype="0" fill="hold" nodeType="afterEffect">
+                                <p:cTn id="41" presetID="1" presetClass="exit" presetSubtype="0" fill="hold" nodeType="afterEffect">
                                   <p:stCondLst>
                                     <p:cond delay="0"/>
                                   </p:stCondLst>
                                   <p:childTnLst>
                                     <p:set>
                                       <p:cBhvr>
-                                        <p:cTn id="31" dur="1" fill="hold">
+                                        <p:cTn id="42" dur="1" fill="hold">
                                           <p:stCondLst>
                                             <p:cond delay="0"/>
                                           </p:stCondLst>
@@ -23530,20 +23500,20 @@
                           </p:cTn>
                         </p:par>
                         <p:par>
-                          <p:cTn id="32" fill="hold">
+                          <p:cTn id="43" fill="hold">
                             <p:stCondLst>
-                              <p:cond delay="3500"/>
+                              <p:cond delay="1500"/>
                             </p:stCondLst>
                             <p:childTnLst>
                               <p:par>
-                                <p:cTn id="33" presetID="26" presetClass="emph" presetSubtype="0" fill="hold" nodeType="afterEffect">
+                                <p:cTn id="44" presetID="26" presetClass="emph" presetSubtype="0" fill="hold" nodeType="afterEffect">
                                   <p:stCondLst>
                                     <p:cond delay="0"/>
                                   </p:stCondLst>
                                   <p:childTnLst>
                                     <p:animEffect transition="out" filter="fade">
                                       <p:cBhvr>
-                                        <p:cTn id="34" dur="500" tmFilter="0, 0; .2, .5; .8, .5; 1, 0"/>
+                                        <p:cTn id="45" dur="500" tmFilter="0, 0; .2, .5; .8, .5; 1, 0"/>
                                         <p:tgtEl>
                                           <p:spTgt spid="35"/>
                                         </p:tgtEl>
@@ -23551,7 +23521,7 @@
                                     </p:animEffect>
                                     <p:animScale>
                                       <p:cBhvr>
-                                        <p:cTn id="35" dur="250" autoRev="1" fill="hold"/>
+                                        <p:cTn id="46" dur="250" autoRev="1" fill="hold"/>
                                         <p:tgtEl>
                                           <p:spTgt spid="35"/>
                                         </p:tgtEl>
@@ -23565,20 +23535,20 @@
                           </p:cTn>
                         </p:par>
                         <p:par>
-                          <p:cTn id="36" fill="hold">
+                          <p:cTn id="47" fill="hold">
                             <p:stCondLst>
-                              <p:cond delay="4000"/>
+                              <p:cond delay="2000"/>
                             </p:stCondLst>
                             <p:childTnLst>
                               <p:par>
-                                <p:cTn id="37" presetID="22" presetClass="entr" presetSubtype="4" fill="hold" grpId="0" nodeType="afterEffect">
+                                <p:cTn id="48" presetID="22" presetClass="entr" presetSubtype="4" fill="hold" grpId="0" nodeType="afterEffect">
                                   <p:stCondLst>
                                     <p:cond delay="0"/>
                                   </p:stCondLst>
                                   <p:childTnLst>
                                     <p:set>
                                       <p:cBhvr>
-                                        <p:cTn id="38" dur="1" fill="hold">
+                                        <p:cTn id="49" dur="1" fill="hold">
                                           <p:stCondLst>
                                             <p:cond delay="0"/>
                                           </p:stCondLst>
@@ -23596,7 +23566,7 @@
                                     </p:set>
                                     <p:animEffect transition="in" filter="wipe(down)">
                                       <p:cBhvr>
-                                        <p:cTn id="39" dur="500"/>
+                                        <p:cTn id="50" dur="500"/>
                                         <p:tgtEl>
                                           <p:spTgt spid="34"/>
                                         </p:tgtEl>
@@ -23612,26 +23582,26 @@
                     </p:cTn>
                   </p:par>
                   <p:par>
-                    <p:cTn id="40" fill="hold">
+                    <p:cTn id="51" fill="hold">
                       <p:stCondLst>
                         <p:cond delay="indefinite"/>
                       </p:stCondLst>
                       <p:childTnLst>
                         <p:par>
-                          <p:cTn id="41" fill="hold">
+                          <p:cTn id="52" fill="hold">
                             <p:stCondLst>
                               <p:cond delay="0"/>
                             </p:stCondLst>
                             <p:childTnLst>
                               <p:par>
-                                <p:cTn id="42" presetID="10" presetClass="exit" presetSubtype="0" fill="hold" grpId="1" nodeType="clickEffect">
+                                <p:cTn id="53" presetID="10" presetClass="exit" presetSubtype="0" fill="hold" grpId="1" nodeType="clickEffect">
                                   <p:stCondLst>
                                     <p:cond delay="0"/>
                                   </p:stCondLst>
                                   <p:childTnLst>
                                     <p:animEffect transition="out" filter="fade">
                                       <p:cBhvr>
-                                        <p:cTn id="43" dur="500"/>
+                                        <p:cTn id="54" dur="500"/>
                                         <p:tgtEl>
                                           <p:spTgt spid="29"/>
                                         </p:tgtEl>
@@ -23639,7 +23609,7 @@
                                     </p:animEffect>
                                     <p:set>
                                       <p:cBhvr>
-                                        <p:cTn id="44" dur="1" fill="hold">
+                                        <p:cTn id="55" dur="1" fill="hold">
                                           <p:stCondLst>
                                             <p:cond delay="499"/>
                                           </p:stCondLst>
@@ -23659,102 +23629,14 @@
                                 </p:cTn>
                               </p:par>
                               <p:par>
-                                <p:cTn id="45" presetID="10" presetClass="exit" presetSubtype="0" fill="hold" grpId="1" nodeType="withEffect">
-                                  <p:stCondLst>
-                                    <p:cond delay="0"/>
-                                  </p:stCondLst>
-                                  <p:childTnLst>
-                                    <p:animEffect transition="out" filter="fade">
-                                      <p:cBhvr>
-                                        <p:cTn id="46" dur="500"/>
-                                        <p:tgtEl>
-                                          <p:spTgt spid="34"/>
-                                        </p:tgtEl>
-                                      </p:cBhvr>
-                                    </p:animEffect>
-                                    <p:set>
-                                      <p:cBhvr>
-                                        <p:cTn id="47" dur="1" fill="hold">
-                                          <p:stCondLst>
-                                            <p:cond delay="499"/>
-                                          </p:stCondLst>
-                                        </p:cTn>
-                                        <p:tgtEl>
-                                          <p:spTgt spid="34"/>
-                                        </p:tgtEl>
-                                        <p:attrNameLst>
-                                          <p:attrName>style.visibility</p:attrName>
-                                        </p:attrNameLst>
-                                      </p:cBhvr>
-                                      <p:to>
-                                        <p:strVal val="hidden"/>
-                                      </p:to>
-                                    </p:set>
-                                  </p:childTnLst>
-                                </p:cTn>
-                              </p:par>
-                            </p:childTnLst>
-                          </p:cTn>
-                        </p:par>
-                        <p:par>
-                          <p:cTn id="48" fill="hold">
-                            <p:stCondLst>
-                              <p:cond delay="500"/>
-                            </p:stCondLst>
-                            <p:childTnLst>
-                              <p:par>
-                                <p:cTn id="49" presetID="10" presetClass="exit" presetSubtype="0" fill="hold" nodeType="afterEffect">
-                                  <p:stCondLst>
-                                    <p:cond delay="0"/>
-                                  </p:stCondLst>
-                                  <p:childTnLst>
-                                    <p:animEffect transition="out" filter="fade">
-                                      <p:cBhvr>
-                                        <p:cTn id="50" dur="500"/>
-                                        <p:tgtEl>
-                                          <p:spTgt spid="54"/>
-                                        </p:tgtEl>
-                                      </p:cBhvr>
-                                    </p:animEffect>
-                                    <p:set>
-                                      <p:cBhvr>
-                                        <p:cTn id="51" dur="1" fill="hold">
-                                          <p:stCondLst>
-                                            <p:cond delay="499"/>
-                                          </p:stCondLst>
-                                        </p:cTn>
-                                        <p:tgtEl>
-                                          <p:spTgt spid="54"/>
-                                        </p:tgtEl>
-                                        <p:attrNameLst>
-                                          <p:attrName>style.visibility</p:attrName>
-                                        </p:attrNameLst>
-                                      </p:cBhvr>
-                                      <p:to>
-                                        <p:strVal val="hidden"/>
-                                      </p:to>
-                                    </p:set>
-                                  </p:childTnLst>
-                                </p:cTn>
-                              </p:par>
-                            </p:childTnLst>
-                          </p:cTn>
-                        </p:par>
-                        <p:par>
-                          <p:cTn id="52" fill="hold">
-                            <p:stCondLst>
-                              <p:cond delay="1000"/>
-                            </p:stCondLst>
-                            <p:childTnLst>
-                              <p:par>
-                                <p:cTn id="53" presetID="21" presetClass="entr" presetSubtype="1" fill="hold" grpId="0" nodeType="afterEffect">
+                                <p:cTn id="56" presetID="21" presetClass="entr" presetSubtype="1" fill="hold" grpId="0" nodeType="withEffect">
                                   <p:stCondLst>
                                     <p:cond delay="0"/>
                                   </p:stCondLst>
                                   <p:childTnLst>
                                     <p:set>
                                       <p:cBhvr>
-                                        <p:cTn id="54" dur="1" fill="hold">
+                                        <p:cTn id="57" dur="1" fill="hold">
                                           <p:stCondLst>
                                             <p:cond delay="0"/>
                                           </p:stCondLst>
@@ -23772,9 +23654,79 @@
                                     </p:set>
                                     <p:animEffect transition="in" filter="wheel(1)">
                                       <p:cBhvr>
-                                        <p:cTn id="55" dur="2000"/>
+                                        <p:cTn id="58" dur="2000"/>
                                         <p:tgtEl>
                                           <p:spTgt spid="2"/>
+                                        </p:tgtEl>
+                                      </p:cBhvr>
+                                    </p:animEffect>
+                                  </p:childTnLst>
+                                </p:cTn>
+                              </p:par>
+                              <p:par>
+                                <p:cTn id="59" presetID="21" presetClass="entr" presetSubtype="1" fill="hold" grpId="0" nodeType="withEffect">
+                                  <p:stCondLst>
+                                    <p:cond delay="0"/>
+                                  </p:stCondLst>
+                                  <p:childTnLst>
+                                    <p:set>
+                                      <p:cBhvr>
+                                        <p:cTn id="60" dur="1" fill="hold">
+                                          <p:stCondLst>
+                                            <p:cond delay="0"/>
+                                          </p:stCondLst>
+                                        </p:cTn>
+                                        <p:tgtEl>
+                                          <p:spTgt spid="39"/>
+                                        </p:tgtEl>
+                                        <p:attrNameLst>
+                                          <p:attrName>style.visibility</p:attrName>
+                                        </p:attrNameLst>
+                                      </p:cBhvr>
+                                      <p:to>
+                                        <p:strVal val="visible"/>
+                                      </p:to>
+                                    </p:set>
+                                    <p:animEffect transition="in" filter="wheel(1)">
+                                      <p:cBhvr>
+                                        <p:cTn id="61" dur="2000"/>
+                                        <p:tgtEl>
+                                          <p:spTgt spid="39"/>
+                                        </p:tgtEl>
+                                      </p:cBhvr>
+                                    </p:animEffect>
+                                  </p:childTnLst>
+                                </p:cTn>
+                              </p:par>
+                              <p:par>
+                                <p:cTn id="62" presetID="21" presetClass="entr" presetSubtype="1" fill="hold" grpId="0" nodeType="withEffect">
+                                  <p:stCondLst>
+                                    <p:cond delay="0"/>
+                                  </p:stCondLst>
+                                  <p:childTnLst>
+                                    <p:set>
+                                      <p:cBhvr>
+                                        <p:cTn id="63" dur="1" fill="hold">
+                                          <p:stCondLst>
+                                            <p:cond delay="0"/>
+                                          </p:stCondLst>
+                                        </p:cTn>
+                                        <p:tgtEl>
+                                          <p:spTgt spid="40"/>
+                                        </p:tgtEl>
+                                        <p:attrNameLst>
+                                          <p:attrName>style.visibility</p:attrName>
+                                        </p:attrNameLst>
+                                      </p:cBhvr>
+                                      <p:to>
+                                        <p:strVal val="visible"/>
+                                      </p:to>
+                                    </p:set>
+                                    <p:animEffect transition="in" filter="wheel(1)">
+                                      <p:cBhvr>
+                                        <p:cTn id="64" dur="2000"/>
+                                        <p:tgtEl>
+                                          <p:spTgt spid="40"/>
                                         </p:tgtEl>
                                       </p:cBhvr>
                                     </p:animEffect>
@@ -23784,21 +23736,30 @@
                             </p:childTnLst>
                           </p:cTn>
                         </p:par>
+                      </p:childTnLst>
+                    </p:cTn>
+                  </p:par>
+                  <p:par>
+                    <p:cTn id="65" fill="hold">
+                      <p:stCondLst>
+                        <p:cond delay="indefinite"/>
+                      </p:stCondLst>
+                      <p:childTnLst>
                         <p:par>
-                          <p:cTn id="56" fill="hold">
+                          <p:cTn id="66" fill="hold">
                             <p:stCondLst>
-                              <p:cond delay="3000"/>
+                              <p:cond delay="0"/>
                             </p:stCondLst>
                             <p:childTnLst>
                               <p:par>
-                                <p:cTn id="57" presetID="22" presetClass="entr" presetSubtype="4" fill="hold" nodeType="afterEffect">
+                                <p:cTn id="67" presetID="22" presetClass="entr" presetSubtype="4" fill="hold" nodeType="clickEffect">
                                   <p:stCondLst>
                                     <p:cond delay="0"/>
                                   </p:stCondLst>
                                   <p:childTnLst>
                                     <p:set>
                                       <p:cBhvr>
-                                        <p:cTn id="58" dur="1" fill="hold">
+                                        <p:cTn id="68" dur="1" fill="hold">
                                           <p:stCondLst>
                                             <p:cond delay="0"/>
                                           </p:stCondLst>
@@ -23816,7 +23777,7 @@
                                     </p:set>
                                     <p:animEffect transition="in" filter="wipe(down)">
                                       <p:cBhvr>
-                                        <p:cTn id="59" dur="1000"/>
+                                        <p:cTn id="69" dur="1000"/>
                                         <p:tgtEl>
                                           <p:spTgt spid="38"/>
                                         </p:tgtEl>
@@ -23829,20 +23790,20 @@
                           </p:cTn>
                         </p:par>
                         <p:par>
-                          <p:cTn id="60" fill="hold">
+                          <p:cTn id="70" fill="hold">
                             <p:stCondLst>
-                              <p:cond delay="4000"/>
+                              <p:cond delay="1000"/>
                             </p:stCondLst>
                             <p:childTnLst>
                               <p:par>
-                                <p:cTn id="61" presetID="22" presetClass="entr" presetSubtype="1" fill="hold" grpId="0" nodeType="afterEffect">
+                                <p:cTn id="71" presetID="22" presetClass="entr" presetSubtype="1" fill="hold" grpId="0" nodeType="afterEffect">
                                   <p:stCondLst>
                                     <p:cond delay="0"/>
                                   </p:stCondLst>
                                   <p:childTnLst>
                                     <p:set>
                                       <p:cBhvr>
-                                        <p:cTn id="62" dur="1" fill="hold">
+                                        <p:cTn id="72" dur="1" fill="hold">
                                           <p:stCondLst>
                                             <p:cond delay="0"/>
                                           </p:stCondLst>
@@ -23862,7 +23823,7 @@
                                     </p:set>
                                     <p:animEffect transition="in" filter="wipe(up)">
                                       <p:cBhvr>
-                                        <p:cTn id="63" dur="500"/>
+                                        <p:cTn id="73" dur="500"/>
                                         <p:tgtEl>
                                           <p:spTgt spid="37">
                                             <p:bg/>
@@ -23877,20 +23838,20 @@
                           </p:cTn>
                         </p:par>
                         <p:par>
-                          <p:cTn id="64" fill="hold">
+                          <p:cTn id="74" fill="hold">
                             <p:stCondLst>
-                              <p:cond delay="4500"/>
+                              <p:cond delay="1500"/>
                             </p:stCondLst>
                             <p:childTnLst>
                               <p:par>
-                                <p:cTn id="65" presetID="22" presetClass="entr" presetSubtype="1" fill="hold" grpId="0" nodeType="afterEffect">
+                                <p:cTn id="75" presetID="22" presetClass="entr" presetSubtype="1" fill="hold" grpId="0" nodeType="afterEffect">
                                   <p:stCondLst>
                                     <p:cond delay="0"/>
                                   </p:stCondLst>
                                   <p:childTnLst>
                                     <p:set>
                                       <p:cBhvr>
-                                        <p:cTn id="66" dur="1" fill="hold">
+                                        <p:cTn id="76" dur="1" fill="hold">
                                           <p:stCondLst>
                                             <p:cond delay="0"/>
                                           </p:stCondLst>
@@ -23912,7 +23873,7 @@
                                     </p:set>
                                     <p:animEffect transition="in" filter="wipe(up)">
                                       <p:cBhvr>
-                                        <p:cTn id="67" dur="500"/>
+                                        <p:cTn id="77" dur="500"/>
                                         <p:tgtEl>
                                           <p:spTgt spid="37">
                                             <p:txEl>
@@ -23929,20 +23890,20 @@
                           </p:cTn>
                         </p:par>
                         <p:par>
-                          <p:cTn id="68" fill="hold">
+                          <p:cTn id="78" fill="hold">
                             <p:stCondLst>
-                              <p:cond delay="5000"/>
+                              <p:cond delay="2000"/>
                             </p:stCondLst>
                             <p:childTnLst>
                               <p:par>
-                                <p:cTn id="69" presetID="22" presetClass="entr" presetSubtype="1" fill="hold" grpId="0" nodeType="afterEffect">
+                                <p:cTn id="79" presetID="22" presetClass="entr" presetSubtype="1" fill="hold" grpId="0" nodeType="afterEffect">
                                   <p:stCondLst>
                                     <p:cond delay="0"/>
                                   </p:stCondLst>
                                   <p:childTnLst>
                                     <p:set>
                                       <p:cBhvr>
-                                        <p:cTn id="70" dur="1" fill="hold">
+                                        <p:cTn id="80" dur="1" fill="hold">
                                           <p:stCondLst>
                                             <p:cond delay="0"/>
                                           </p:stCondLst>
@@ -23964,7 +23925,7 @@
                                     </p:set>
                                     <p:animEffect transition="in" filter="wipe(up)">
                                       <p:cBhvr>
-                                        <p:cTn id="71" dur="500"/>
+                                        <p:cTn id="81" dur="500"/>
                                         <p:tgtEl>
                                           <p:spTgt spid="37">
                                             <p:txEl>
@@ -23981,20 +23942,20 @@
                           </p:cTn>
                         </p:par>
                         <p:par>
-                          <p:cTn id="72" fill="hold">
+                          <p:cTn id="82" fill="hold">
                             <p:stCondLst>
-                              <p:cond delay="5500"/>
+                              <p:cond delay="2500"/>
                             </p:stCondLst>
                             <p:childTnLst>
                               <p:par>
-                                <p:cTn id="73" presetID="22" presetClass="entr" presetSubtype="1" fill="hold" grpId="0" nodeType="afterEffect">
+                                <p:cTn id="83" presetID="22" presetClass="entr" presetSubtype="1" fill="hold" grpId="0" nodeType="afterEffect">
                                   <p:stCondLst>
                                     <p:cond delay="0"/>
                                   </p:stCondLst>
                                   <p:childTnLst>
                                     <p:set>
                                       <p:cBhvr>
-                                        <p:cTn id="74" dur="1" fill="hold">
+                                        <p:cTn id="84" dur="1" fill="hold">
                                           <p:stCondLst>
                                             <p:cond delay="0"/>
                                           </p:stCondLst>
@@ -24016,7 +23977,7 @@
                                     </p:set>
                                     <p:animEffect transition="in" filter="wipe(up)">
                                       <p:cBhvr>
-                                        <p:cTn id="75" dur="500"/>
+                                        <p:cTn id="85" dur="500"/>
                                         <p:tgtEl>
                                           <p:spTgt spid="37">
                                             <p:txEl>
@@ -24033,20 +23994,20 @@
                           </p:cTn>
                         </p:par>
                         <p:par>
-                          <p:cTn id="76" fill="hold">
+                          <p:cTn id="86" fill="hold">
                             <p:stCondLst>
-                              <p:cond delay="6000"/>
+                              <p:cond delay="3000"/>
                             </p:stCondLst>
                             <p:childTnLst>
                               <p:par>
-                                <p:cTn id="77" presetID="22" presetClass="entr" presetSubtype="1" fill="hold" grpId="0" nodeType="afterEffect">
+                                <p:cTn id="87" presetID="22" presetClass="entr" presetSubtype="1" fill="hold" grpId="0" nodeType="afterEffect">
                                   <p:stCondLst>
                                     <p:cond delay="0"/>
                                   </p:stCondLst>
                                   <p:childTnLst>
                                     <p:set>
                                       <p:cBhvr>
-                                        <p:cTn id="78" dur="1" fill="hold">
+                                        <p:cTn id="88" dur="1" fill="hold">
                                           <p:stCondLst>
                                             <p:cond delay="0"/>
                                           </p:stCondLst>
@@ -24068,7 +24029,7 @@
                                     </p:set>
                                     <p:animEffect transition="in" filter="wipe(up)">
                                       <p:cBhvr>
-                                        <p:cTn id="79" dur="500"/>
+                                        <p:cTn id="89" dur="500"/>
                                         <p:tgtEl>
                                           <p:spTgt spid="37">
                                             <p:txEl>
@@ -24111,9 +24072,10 @@
     <p:bldLst>
       <p:bldP spid="29" grpId="0" animBg="1"/>
       <p:bldP spid="29" grpId="1" animBg="1"/>
+      <p:bldP spid="2" grpId="0" animBg="1"/>
       <p:bldP spid="34" grpId="0" animBg="1"/>
-      <p:bldP spid="34" grpId="1" animBg="1"/>
-      <p:bldP spid="2" grpId="0" animBg="1"/>
+      <p:bldP spid="39" grpId="0" animBg="1"/>
+      <p:bldP spid="40" grpId="0" animBg="1"/>
       <p:bldP spid="37" grpId="0" build="p" animBg="1"/>
     </p:bldLst>
   </p:timing>
@@ -25015,7 +24977,7 @@
               <a:t>Single point of maintenance: Database tables (</a:t>
             </a:r>
             <a:r>
-              <a:rPr lang="en-US" sz="2000" b="1" dirty="0"/>
+              <a:rPr lang="en-US" sz="2000" b="1" u="sng" dirty="0"/>
               <a:t>Data, not Code!</a:t>
             </a:r>
             <a:r>

</xml_diff>

<commit_message>
last moment presentation changes
</commit_message>
<xml_diff>
--- a/DynamicFilters_Presentation_Eng.pptx
+++ b/DynamicFilters_Presentation_Eng.pptx
@@ -24792,6 +24792,668 @@
           </a:p>
         </p:txBody>
       </p:sp>
+      <p:sp>
+        <p:nvSpPr>
+          <p:cNvPr id="50" name="Rectangle 49">
+            <a:extLst>
+              <a:ext uri="{FF2B5EF4-FFF2-40B4-BE49-F238E27FC236}">
+                <a16:creationId xmlns:a16="http://schemas.microsoft.com/office/drawing/2014/main" id="{E5878D29-D7F1-4717-8BE8-959911BAD982}"/>
+              </a:ext>
+            </a:extLst>
+          </p:cNvPr>
+          <p:cNvSpPr/>
+          <p:nvPr/>
+        </p:nvSpPr>
+        <p:spPr>
+          <a:xfrm>
+            <a:off x="5884005" y="4254353"/>
+            <a:ext cx="782845" cy="211682"/>
+          </a:xfrm>
+          <a:prstGeom prst="rect">
+            <a:avLst/>
+          </a:prstGeom>
+          <a:noFill/>
+          <a:ln>
+            <a:solidFill>
+              <a:srgbClr val="FF0000"/>
+            </a:solidFill>
+          </a:ln>
+        </p:spPr>
+        <p:style>
+          <a:lnRef idx="2">
+            <a:schemeClr val="accent6"/>
+          </a:lnRef>
+          <a:fillRef idx="1">
+            <a:schemeClr val="lt1"/>
+          </a:fillRef>
+          <a:effectRef idx="0">
+            <a:schemeClr val="accent6"/>
+          </a:effectRef>
+          <a:fontRef idx="minor">
+            <a:schemeClr val="dk1"/>
+          </a:fontRef>
+        </p:style>
+        <p:txBody>
+          <a:bodyPr rtlCol="0" anchor="ctr"/>
+          <a:lstStyle/>
+          <a:p>
+            <a:pPr algn="ctr"/>
+            <a:endParaRPr lang="en-US"/>
+          </a:p>
+        </p:txBody>
+      </p:sp>
+      <p:sp>
+        <p:nvSpPr>
+          <p:cNvPr id="51" name="Rectangle 50">
+            <a:extLst>
+              <a:ext uri="{FF2B5EF4-FFF2-40B4-BE49-F238E27FC236}">
+                <a16:creationId xmlns:a16="http://schemas.microsoft.com/office/drawing/2014/main" id="{4F1C6A34-6302-409A-BD2C-DF64A7686B65}"/>
+              </a:ext>
+            </a:extLst>
+          </p:cNvPr>
+          <p:cNvSpPr/>
+          <p:nvPr/>
+        </p:nvSpPr>
+        <p:spPr>
+          <a:xfrm>
+            <a:off x="2336309" y="4912573"/>
+            <a:ext cx="852373" cy="194107"/>
+          </a:xfrm>
+          <a:prstGeom prst="rect">
+            <a:avLst/>
+          </a:prstGeom>
+          <a:noFill/>
+          <a:ln>
+            <a:solidFill>
+              <a:srgbClr val="FF0000"/>
+            </a:solidFill>
+          </a:ln>
+        </p:spPr>
+        <p:style>
+          <a:lnRef idx="2">
+            <a:schemeClr val="accent6"/>
+          </a:lnRef>
+          <a:fillRef idx="1">
+            <a:schemeClr val="lt1"/>
+          </a:fillRef>
+          <a:effectRef idx="0">
+            <a:schemeClr val="accent6"/>
+          </a:effectRef>
+          <a:fontRef idx="minor">
+            <a:schemeClr val="dk1"/>
+          </a:fontRef>
+        </p:style>
+        <p:txBody>
+          <a:bodyPr rtlCol="0" anchor="ctr"/>
+          <a:lstStyle/>
+          <a:p>
+            <a:pPr algn="ctr"/>
+            <a:endParaRPr lang="en-US"/>
+          </a:p>
+        </p:txBody>
+      </p:sp>
+      <p:grpSp>
+        <p:nvGrpSpPr>
+          <p:cNvPr id="16" name="Group 15">
+            <a:extLst>
+              <a:ext uri="{FF2B5EF4-FFF2-40B4-BE49-F238E27FC236}">
+                <a16:creationId xmlns:a16="http://schemas.microsoft.com/office/drawing/2014/main" id="{60D1390C-F97A-4DF7-A379-508B26420CA5}"/>
+              </a:ext>
+            </a:extLst>
+          </p:cNvPr>
+          <p:cNvGrpSpPr/>
+          <p:nvPr/>
+        </p:nvGrpSpPr>
+        <p:grpSpPr>
+          <a:xfrm>
+            <a:off x="43244" y="414275"/>
+            <a:ext cx="8442585" cy="4734231"/>
+            <a:chOff x="43244" y="414275"/>
+            <a:chExt cx="8442585" cy="4734231"/>
+          </a:xfrm>
+        </p:grpSpPr>
+        <p:sp>
+          <p:nvSpPr>
+            <p:cNvPr id="14" name="TextBox 13">
+              <a:extLst>
+                <a:ext uri="{FF2B5EF4-FFF2-40B4-BE49-F238E27FC236}">
+                  <a16:creationId xmlns:a16="http://schemas.microsoft.com/office/drawing/2014/main" id="{B414F939-7D1D-4BDB-BE21-3B4ABFE403F1}"/>
+                </a:ext>
+              </a:extLst>
+            </p:cNvPr>
+            <p:cNvSpPr txBox="1"/>
+            <p:nvPr/>
+          </p:nvSpPr>
+          <p:spPr>
+            <a:xfrm>
+              <a:off x="1215890" y="4194399"/>
+              <a:ext cx="7269939" cy="954107"/>
+            </a:xfrm>
+            <a:prstGeom prst="rect">
+              <a:avLst/>
+            </a:prstGeom>
+            <a:noFill/>
+            <a:ln>
+              <a:noFill/>
+            </a:ln>
+          </p:spPr>
+          <p:txBody>
+            <a:bodyPr wrap="none" rtlCol="0">
+              <a:spAutoFit/>
+            </a:bodyPr>
+            <a:lstStyle/>
+            <a:p>
+              <a:r>
+                <a:rPr lang="en-US" sz="1400" dirty="0">
+                  <a:solidFill>
+                    <a:srgbClr val="0000FF"/>
+                  </a:solidFill>
+                  <a:latin typeface="Consolas" panose="020B0609020204030204" pitchFamily="49" charset="0"/>
+                </a:rPr>
+                <a:t>EXEC</a:t>
+              </a:r>
+              <a:r>
+                <a:rPr lang="en-US" sz="1400" dirty="0">
+                  <a:solidFill>
+                    <a:srgbClr val="000000"/>
+                  </a:solidFill>
+                  <a:latin typeface="Consolas" panose="020B0609020204030204" pitchFamily="49" charset="0"/>
+                </a:rPr>
+                <a:t> </a:t>
+              </a:r>
+              <a:r>
+                <a:rPr lang="en-US" sz="1400" dirty="0" err="1">
+                  <a:solidFill>
+                    <a:srgbClr val="800000"/>
+                  </a:solidFill>
+                  <a:latin typeface="Consolas" panose="020B0609020204030204" pitchFamily="49" charset="0"/>
+                </a:rPr>
+                <a:t>sp_executesql</a:t>
+              </a:r>
+              <a:r>
+                <a:rPr lang="en-US" sz="1400" dirty="0">
+                  <a:solidFill>
+                    <a:srgbClr val="0000FF"/>
+                  </a:solidFill>
+                  <a:latin typeface="Consolas" panose="020B0609020204030204" pitchFamily="49" charset="0"/>
+                </a:rPr>
+                <a:t> </a:t>
+              </a:r>
+              <a:r>
+                <a:rPr lang="en-US" sz="1400" dirty="0">
+                  <a:solidFill>
+                    <a:srgbClr val="000000"/>
+                  </a:solidFill>
+                  <a:latin typeface="Consolas" panose="020B0609020204030204" pitchFamily="49" charset="0"/>
+                </a:rPr>
+                <a:t>@</a:t>
+              </a:r>
+              <a:r>
+                <a:rPr lang="en-US" sz="1400" dirty="0" err="1">
+                  <a:solidFill>
+                    <a:srgbClr val="000000"/>
+                  </a:solidFill>
+                  <a:latin typeface="Consolas" panose="020B0609020204030204" pitchFamily="49" charset="0"/>
+                </a:rPr>
+                <a:t>ParsedSQL</a:t>
+              </a:r>
+              <a:r>
+                <a:rPr lang="en-US" sz="1400" dirty="0">
+                  <a:solidFill>
+                    <a:srgbClr val="808080"/>
+                  </a:solidFill>
+                  <a:latin typeface="Consolas" panose="020B0609020204030204" pitchFamily="49" charset="0"/>
+                </a:rPr>
+                <a:t>,</a:t>
+              </a:r>
+              <a:r>
+                <a:rPr lang="en-US" sz="1400" dirty="0">
+                  <a:solidFill>
+                    <a:srgbClr val="000000"/>
+                  </a:solidFill>
+                  <a:latin typeface="Consolas" panose="020B0609020204030204" pitchFamily="49" charset="0"/>
+                </a:rPr>
+                <a:t> </a:t>
+              </a:r>
+              <a:r>
+                <a:rPr lang="en-US" sz="1400" dirty="0" err="1">
+                  <a:solidFill>
+                    <a:srgbClr val="FF0000"/>
+                  </a:solidFill>
+                  <a:latin typeface="Consolas" panose="020B0609020204030204" pitchFamily="49" charset="0"/>
+                </a:rPr>
+                <a:t>N'@Params</a:t>
+              </a:r>
+              <a:r>
+                <a:rPr lang="en-US" sz="1400" dirty="0">
+                  <a:solidFill>
+                    <a:srgbClr val="FF0000"/>
+                  </a:solidFill>
+                  <a:latin typeface="Consolas" panose="020B0609020204030204" pitchFamily="49" charset="0"/>
+                </a:rPr>
+                <a:t> ???'</a:t>
+              </a:r>
+              <a:r>
+                <a:rPr lang="en-US" sz="1400" dirty="0">
+                  <a:solidFill>
+                    <a:srgbClr val="808080"/>
+                  </a:solidFill>
+                  <a:latin typeface="Consolas" panose="020B0609020204030204" pitchFamily="49" charset="0"/>
+                </a:rPr>
+                <a:t>,</a:t>
+              </a:r>
+              <a:r>
+                <a:rPr lang="en-US" sz="1400" dirty="0">
+                  <a:solidFill>
+                    <a:srgbClr val="000000"/>
+                  </a:solidFill>
+                  <a:latin typeface="Consolas" panose="020B0609020204030204" pitchFamily="49" charset="0"/>
+                </a:rPr>
+                <a:t> @Params</a:t>
+              </a:r>
+            </a:p>
+            <a:p>
+              <a:r>
+                <a:rPr lang="en-US" sz="1400" dirty="0">
+                  <a:solidFill>
+                    <a:srgbClr val="0000FF"/>
+                  </a:solidFill>
+                  <a:latin typeface="Consolas" panose="020B0609020204030204" pitchFamily="49" charset="0"/>
+                </a:rPr>
+                <a:t>EXEC</a:t>
+              </a:r>
+              <a:r>
+                <a:rPr lang="en-US" sz="1400" dirty="0">
+                  <a:solidFill>
+                    <a:srgbClr val="000000"/>
+                  </a:solidFill>
+                  <a:latin typeface="Consolas" panose="020B0609020204030204" pitchFamily="49" charset="0"/>
+                </a:rPr>
+                <a:t> </a:t>
+              </a:r>
+              <a:r>
+                <a:rPr lang="en-US" sz="1400" dirty="0" err="1">
+                  <a:solidFill>
+                    <a:srgbClr val="800000"/>
+                  </a:solidFill>
+                  <a:latin typeface="Consolas" panose="020B0609020204030204" pitchFamily="49" charset="0"/>
+                </a:rPr>
+                <a:t>sp_executesql</a:t>
+              </a:r>
+              <a:r>
+                <a:rPr lang="en-US" sz="1400" dirty="0">
+                  <a:solidFill>
+                    <a:srgbClr val="0000FF"/>
+                  </a:solidFill>
+                  <a:latin typeface="Consolas" panose="020B0609020204030204" pitchFamily="49" charset="0"/>
+                </a:rPr>
+                <a:t> </a:t>
+              </a:r>
+              <a:r>
+                <a:rPr lang="en-US" sz="1400" dirty="0">
+                  <a:solidFill>
+                    <a:srgbClr val="000000"/>
+                  </a:solidFill>
+                  <a:latin typeface="Consolas" panose="020B0609020204030204" pitchFamily="49" charset="0"/>
+                </a:rPr>
+                <a:t>@</a:t>
+              </a:r>
+              <a:r>
+                <a:rPr lang="en-US" sz="1400" dirty="0" err="1">
+                  <a:solidFill>
+                    <a:srgbClr val="000000"/>
+                  </a:solidFill>
+                  <a:latin typeface="Consolas" panose="020B0609020204030204" pitchFamily="49" charset="0"/>
+                </a:rPr>
+                <a:t>ParsedSQL</a:t>
+              </a:r>
+              <a:endParaRPr lang="en-US" sz="1400" dirty="0">
+                <a:solidFill>
+                  <a:srgbClr val="000000"/>
+                </a:solidFill>
+                <a:latin typeface="Consolas" panose="020B0609020204030204" pitchFamily="49" charset="0"/>
+              </a:endParaRPr>
+            </a:p>
+            <a:p>
+              <a:r>
+                <a:rPr lang="en-US" sz="1400" dirty="0">
+                  <a:solidFill>
+                    <a:srgbClr val="000000"/>
+                  </a:solidFill>
+                  <a:latin typeface="Consolas" panose="020B0609020204030204" pitchFamily="49" charset="0"/>
+                </a:rPr>
+                <a:t>	</a:t>
+              </a:r>
+              <a:r>
+                <a:rPr lang="en-US" sz="1400" dirty="0">
+                  <a:solidFill>
+                    <a:srgbClr val="808080"/>
+                  </a:solidFill>
+                  <a:latin typeface="Consolas" panose="020B0609020204030204" pitchFamily="49" charset="0"/>
+                </a:rPr>
+                <a:t>,</a:t>
+              </a:r>
+              <a:r>
+                <a:rPr lang="en-US" sz="1400" dirty="0">
+                  <a:solidFill>
+                    <a:srgbClr val="000000"/>
+                  </a:solidFill>
+                  <a:latin typeface="Consolas" panose="020B0609020204030204" pitchFamily="49" charset="0"/>
+                </a:rPr>
+                <a:t> </a:t>
+              </a:r>
+              <a:r>
+                <a:rPr lang="en-US" sz="1400" dirty="0" err="1">
+                  <a:solidFill>
+                    <a:srgbClr val="FF0000"/>
+                  </a:solidFill>
+                  <a:latin typeface="Consolas" panose="020B0609020204030204" pitchFamily="49" charset="0"/>
+                </a:rPr>
+                <a:t>N'@Params</a:t>
+              </a:r>
+              <a:r>
+                <a:rPr lang="en-US" sz="1400" dirty="0">
+                  <a:solidFill>
+                    <a:srgbClr val="FF0000"/>
+                  </a:solidFill>
+                  <a:latin typeface="Consolas" panose="020B0609020204030204" pitchFamily="49" charset="0"/>
+                </a:rPr>
+                <a:t> ???, @CMD nvarchar(max), @</a:t>
+              </a:r>
+              <a:r>
+                <a:rPr lang="en-US" sz="1400" dirty="0" err="1">
+                  <a:solidFill>
+                    <a:srgbClr val="FF0000"/>
+                  </a:solidFill>
+                  <a:latin typeface="Consolas" panose="020B0609020204030204" pitchFamily="49" charset="0"/>
+                </a:rPr>
+                <a:t>CMDParams</a:t>
+              </a:r>
+              <a:r>
+                <a:rPr lang="en-US" sz="1400" dirty="0">
+                  <a:solidFill>
+                    <a:srgbClr val="FF0000"/>
+                  </a:solidFill>
+                  <a:latin typeface="Consolas" panose="020B0609020204030204" pitchFamily="49" charset="0"/>
+                </a:rPr>
+                <a:t> nvarchar(max)’</a:t>
+              </a:r>
+            </a:p>
+            <a:p>
+              <a:r>
+                <a:rPr lang="en-US" sz="1400" dirty="0">
+                  <a:solidFill>
+                    <a:srgbClr val="FF0000"/>
+                  </a:solidFill>
+                  <a:latin typeface="Consolas" panose="020B0609020204030204" pitchFamily="49" charset="0"/>
+                </a:rPr>
+                <a:t>	</a:t>
+              </a:r>
+              <a:r>
+                <a:rPr lang="en-US" sz="1400" dirty="0">
+                  <a:solidFill>
+                    <a:srgbClr val="808080"/>
+                  </a:solidFill>
+                  <a:latin typeface="Consolas" panose="020B0609020204030204" pitchFamily="49" charset="0"/>
+                </a:rPr>
+                <a:t>,</a:t>
+              </a:r>
+              <a:r>
+                <a:rPr lang="en-US" sz="1400" dirty="0">
+                  <a:solidFill>
+                    <a:srgbClr val="000000"/>
+                  </a:solidFill>
+                  <a:latin typeface="Consolas" panose="020B0609020204030204" pitchFamily="49" charset="0"/>
+                </a:rPr>
+                <a:t> @Params</a:t>
+              </a:r>
+              <a:r>
+                <a:rPr lang="en-US" sz="1400" dirty="0">
+                  <a:solidFill>
+                    <a:srgbClr val="808080"/>
+                  </a:solidFill>
+                  <a:latin typeface="Consolas" panose="020B0609020204030204" pitchFamily="49" charset="0"/>
+                </a:rPr>
+                <a:t>,</a:t>
+              </a:r>
+              <a:r>
+                <a:rPr lang="en-US" sz="1400" dirty="0">
+                  <a:solidFill>
+                    <a:srgbClr val="000000"/>
+                  </a:solidFill>
+                  <a:latin typeface="Consolas" panose="020B0609020204030204" pitchFamily="49" charset="0"/>
+                </a:rPr>
+                <a:t> @CMD</a:t>
+              </a:r>
+              <a:r>
+                <a:rPr lang="en-US" sz="1400" dirty="0">
+                  <a:solidFill>
+                    <a:srgbClr val="808080"/>
+                  </a:solidFill>
+                  <a:latin typeface="Consolas" panose="020B0609020204030204" pitchFamily="49" charset="0"/>
+                </a:rPr>
+                <a:t>,</a:t>
+              </a:r>
+              <a:r>
+                <a:rPr lang="en-US" sz="1400" dirty="0">
+                  <a:solidFill>
+                    <a:srgbClr val="000000"/>
+                  </a:solidFill>
+                  <a:latin typeface="Consolas" panose="020B0609020204030204" pitchFamily="49" charset="0"/>
+                </a:rPr>
+                <a:t> @</a:t>
+              </a:r>
+              <a:r>
+                <a:rPr lang="en-US" sz="1400" dirty="0" err="1">
+                  <a:solidFill>
+                    <a:srgbClr val="000000"/>
+                  </a:solidFill>
+                  <a:latin typeface="Consolas" panose="020B0609020204030204" pitchFamily="49" charset="0"/>
+                </a:rPr>
+                <a:t>CMDParams</a:t>
+              </a:r>
+              <a:endParaRPr lang="en-US" sz="1400" dirty="0">
+                <a:solidFill>
+                  <a:srgbClr val="000000"/>
+                </a:solidFill>
+                <a:latin typeface="Consolas" panose="020B0609020204030204" pitchFamily="49" charset="0"/>
+              </a:endParaRPr>
+            </a:p>
+          </p:txBody>
+        </p:sp>
+        <p:sp>
+          <p:nvSpPr>
+            <p:cNvPr id="15" name="TextBox 14">
+              <a:extLst>
+                <a:ext uri="{FF2B5EF4-FFF2-40B4-BE49-F238E27FC236}">
+                  <a16:creationId xmlns:a16="http://schemas.microsoft.com/office/drawing/2014/main" id="{40AAE880-D614-453A-9D6B-D0F66BD88F08}"/>
+                </a:ext>
+              </a:extLst>
+            </p:cNvPr>
+            <p:cNvSpPr txBox="1"/>
+            <p:nvPr/>
+          </p:nvSpPr>
+          <p:spPr>
+            <a:xfrm>
+              <a:off x="1004095" y="4219814"/>
+              <a:ext cx="253596" cy="246221"/>
+            </a:xfrm>
+            <a:prstGeom prst="rect">
+              <a:avLst/>
+            </a:prstGeom>
+          </p:spPr>
+          <p:style>
+            <a:lnRef idx="1">
+              <a:schemeClr val="accent2"/>
+            </a:lnRef>
+            <a:fillRef idx="3">
+              <a:schemeClr val="accent2"/>
+            </a:fillRef>
+            <a:effectRef idx="2">
+              <a:schemeClr val="accent2"/>
+            </a:effectRef>
+            <a:fontRef idx="minor">
+              <a:schemeClr val="lt1"/>
+            </a:fontRef>
+          </p:style>
+          <p:txBody>
+            <a:bodyPr wrap="square" rtlCol="0">
+              <a:spAutoFit/>
+            </a:bodyPr>
+            <a:lstStyle/>
+            <a:p>
+              <a:r>
+                <a:rPr lang="en-US" sz="1000" dirty="0"/>
+                <a:t>1</a:t>
+              </a:r>
+            </a:p>
+          </p:txBody>
+        </p:sp>
+        <p:sp>
+          <p:nvSpPr>
+            <p:cNvPr id="52" name="TextBox 51">
+              <a:extLst>
+                <a:ext uri="{FF2B5EF4-FFF2-40B4-BE49-F238E27FC236}">
+                  <a16:creationId xmlns:a16="http://schemas.microsoft.com/office/drawing/2014/main" id="{1088EDCE-B756-4C14-83FF-01C07FB63158}"/>
+                </a:ext>
+              </a:extLst>
+            </p:cNvPr>
+            <p:cNvSpPr txBox="1"/>
+            <p:nvPr/>
+          </p:nvSpPr>
+          <p:spPr>
+            <a:xfrm>
+              <a:off x="43244" y="414275"/>
+              <a:ext cx="253596" cy="246221"/>
+            </a:xfrm>
+            <a:prstGeom prst="rect">
+              <a:avLst/>
+            </a:prstGeom>
+          </p:spPr>
+          <p:style>
+            <a:lnRef idx="1">
+              <a:schemeClr val="accent2"/>
+            </a:lnRef>
+            <a:fillRef idx="3">
+              <a:schemeClr val="accent2"/>
+            </a:fillRef>
+            <a:effectRef idx="2">
+              <a:schemeClr val="accent2"/>
+            </a:effectRef>
+            <a:fontRef idx="minor">
+              <a:schemeClr val="lt1"/>
+            </a:fontRef>
+          </p:style>
+          <p:txBody>
+            <a:bodyPr wrap="square" rtlCol="0">
+              <a:spAutoFit/>
+            </a:bodyPr>
+            <a:lstStyle/>
+            <a:p>
+              <a:r>
+                <a:rPr lang="en-US" sz="1000" dirty="0"/>
+                <a:t>1</a:t>
+              </a:r>
+            </a:p>
+          </p:txBody>
+        </p:sp>
+        <p:sp>
+          <p:nvSpPr>
+            <p:cNvPr id="53" name="TextBox 52">
+              <a:extLst>
+                <a:ext uri="{FF2B5EF4-FFF2-40B4-BE49-F238E27FC236}">
+                  <a16:creationId xmlns:a16="http://schemas.microsoft.com/office/drawing/2014/main" id="{6549E8D0-9EAA-4DB2-A14F-6E66542A4503}"/>
+                </a:ext>
+              </a:extLst>
+            </p:cNvPr>
+            <p:cNvSpPr txBox="1"/>
+            <p:nvPr/>
+          </p:nvSpPr>
+          <p:spPr>
+            <a:xfrm>
+              <a:off x="1004095" y="4466358"/>
+              <a:ext cx="253596" cy="246221"/>
+            </a:xfrm>
+            <a:prstGeom prst="rect">
+              <a:avLst/>
+            </a:prstGeom>
+          </p:spPr>
+          <p:style>
+            <a:lnRef idx="1">
+              <a:schemeClr val="accent2"/>
+            </a:lnRef>
+            <a:fillRef idx="3">
+              <a:schemeClr val="accent2"/>
+            </a:fillRef>
+            <a:effectRef idx="2">
+              <a:schemeClr val="accent2"/>
+            </a:effectRef>
+            <a:fontRef idx="minor">
+              <a:schemeClr val="lt1"/>
+            </a:fontRef>
+          </p:style>
+          <p:txBody>
+            <a:bodyPr wrap="square" rtlCol="0">
+              <a:spAutoFit/>
+            </a:bodyPr>
+            <a:lstStyle/>
+            <a:p>
+              <a:r>
+                <a:rPr lang="en-US" sz="1000" dirty="0"/>
+                <a:t>2</a:t>
+              </a:r>
+            </a:p>
+          </p:txBody>
+        </p:sp>
+        <p:sp>
+          <p:nvSpPr>
+            <p:cNvPr id="55" name="TextBox 54">
+              <a:extLst>
+                <a:ext uri="{FF2B5EF4-FFF2-40B4-BE49-F238E27FC236}">
+                  <a16:creationId xmlns:a16="http://schemas.microsoft.com/office/drawing/2014/main" id="{E570C592-C1E7-40BB-B886-5247FCA34619}"/>
+                </a:ext>
+              </a:extLst>
+            </p:cNvPr>
+            <p:cNvSpPr txBox="1"/>
+            <p:nvPr/>
+          </p:nvSpPr>
+          <p:spPr>
+            <a:xfrm>
+              <a:off x="828107" y="2451143"/>
+              <a:ext cx="253596" cy="246221"/>
+            </a:xfrm>
+            <a:prstGeom prst="rect">
+              <a:avLst/>
+            </a:prstGeom>
+          </p:spPr>
+          <p:style>
+            <a:lnRef idx="1">
+              <a:schemeClr val="accent2"/>
+            </a:lnRef>
+            <a:fillRef idx="3">
+              <a:schemeClr val="accent2"/>
+            </a:fillRef>
+            <a:effectRef idx="2">
+              <a:schemeClr val="accent2"/>
+            </a:effectRef>
+            <a:fontRef idx="minor">
+              <a:schemeClr val="lt1"/>
+            </a:fontRef>
+          </p:style>
+          <p:txBody>
+            <a:bodyPr wrap="square" rtlCol="0">
+              <a:spAutoFit/>
+            </a:bodyPr>
+            <a:lstStyle/>
+            <a:p>
+              <a:r>
+                <a:rPr lang="en-US" sz="1000" dirty="0"/>
+                <a:t>2</a:t>
+              </a:r>
+            </a:p>
+          </p:txBody>
+        </p:sp>
+      </p:grpSp>
     </p:spTree>
     <p:custDataLst>
       <p:tags r:id="rId1"/>
@@ -24910,7 +25572,7 @@
                                     </p:set>
                                     <p:anim calcmode="lin" valueType="num">
                                       <p:cBhvr>
-                                        <p:cTn id="11" dur="500" fill="hold"/>
+                                        <p:cTn id="11" dur="1000" fill="hold"/>
                                         <p:tgtEl>
                                           <p:spTgt spid="35"/>
                                         </p:tgtEl>
@@ -24933,7 +25595,7 @@
                                     </p:anim>
                                     <p:anim calcmode="lin" valueType="num">
                                       <p:cBhvr>
-                                        <p:cTn id="12" dur="500" fill="hold"/>
+                                        <p:cTn id="12" dur="1000" fill="hold"/>
                                         <p:tgtEl>
                                           <p:spTgt spid="35"/>
                                         </p:tgtEl>
@@ -24956,7 +25618,7 @@
                                     </p:anim>
                                     <p:animEffect transition="in" filter="fade">
                                       <p:cBhvr>
-                                        <p:cTn id="13" dur="500"/>
+                                        <p:cTn id="13" dur="1000"/>
                                         <p:tgtEl>
                                           <p:spTgt spid="35"/>
                                         </p:tgtEl>
@@ -24971,7 +25633,7 @@
                         <p:par>
                           <p:cTn id="14" fill="hold">
                             <p:stCondLst>
-                              <p:cond delay="1000"/>
+                              <p:cond delay="1500"/>
                             </p:stCondLst>
                             <p:childTnLst>
                               <p:par>
@@ -25657,30 +26319,120 @@
                             </p:childTnLst>
                           </p:cTn>
                         </p:par>
-                      </p:childTnLst>
-                    </p:cTn>
-                  </p:par>
-                  <p:par>
-                    <p:cTn id="60" fill="hold">
-                      <p:stCondLst>
-                        <p:cond delay="indefinite"/>
-                      </p:stCondLst>
-                      <p:childTnLst>
                         <p:par>
-                          <p:cTn id="61" fill="hold">
+                          <p:cTn id="60" fill="hold">
                             <p:stCondLst>
-                              <p:cond delay="0"/>
+                              <p:cond delay="500"/>
                             </p:stCondLst>
                             <p:childTnLst>
                               <p:par>
-                                <p:cTn id="62" presetID="21" presetClass="entr" presetSubtype="1" fill="hold" grpId="0" nodeType="clickEffect">
+                                <p:cTn id="61" presetID="42" presetClass="entr" presetSubtype="0" fill="hold" nodeType="afterEffect">
                                   <p:stCondLst>
                                     <p:cond delay="0"/>
                                   </p:stCondLst>
                                   <p:childTnLst>
                                     <p:set>
                                       <p:cBhvr>
-                                        <p:cTn id="63" dur="1" fill="hold">
+                                        <p:cTn id="62" dur="1" fill="hold">
+                                          <p:stCondLst>
+                                            <p:cond delay="0"/>
+                                          </p:stCondLst>
+                                        </p:cTn>
+                                        <p:tgtEl>
+                                          <p:spTgt spid="16"/>
+                                        </p:tgtEl>
+                                        <p:attrNameLst>
+                                          <p:attrName>style.visibility</p:attrName>
+                                        </p:attrNameLst>
+                                      </p:cBhvr>
+                                      <p:to>
+                                        <p:strVal val="visible"/>
+                                      </p:to>
+                                    </p:set>
+                                    <p:animEffect transition="in" filter="fade">
+                                      <p:cBhvr>
+                                        <p:cTn id="63" dur="1000"/>
+                                        <p:tgtEl>
+                                          <p:spTgt spid="16"/>
+                                        </p:tgtEl>
+                                      </p:cBhvr>
+                                    </p:animEffect>
+                                    <p:anim calcmode="lin" valueType="num">
+                                      <p:cBhvr>
+                                        <p:cTn id="64" dur="1000" fill="hold"/>
+                                        <p:tgtEl>
+                                          <p:spTgt spid="16"/>
+                                        </p:tgtEl>
+                                        <p:attrNameLst>
+                                          <p:attrName>ppt_x</p:attrName>
+                                        </p:attrNameLst>
+                                      </p:cBhvr>
+                                      <p:tavLst>
+                                        <p:tav tm="0">
+                                          <p:val>
+                                            <p:strVal val="#ppt_x"/>
+                                          </p:val>
+                                        </p:tav>
+                                        <p:tav tm="100000">
+                                          <p:val>
+                                            <p:strVal val="#ppt_x"/>
+                                          </p:val>
+                                        </p:tav>
+                                      </p:tavLst>
+                                    </p:anim>
+                                    <p:anim calcmode="lin" valueType="num">
+                                      <p:cBhvr>
+                                        <p:cTn id="65" dur="1000" fill="hold"/>
+                                        <p:tgtEl>
+                                          <p:spTgt spid="16"/>
+                                        </p:tgtEl>
+                                        <p:attrNameLst>
+                                          <p:attrName>ppt_y</p:attrName>
+                                        </p:attrNameLst>
+                                      </p:cBhvr>
+                                      <p:tavLst>
+                                        <p:tav tm="0">
+                                          <p:val>
+                                            <p:strVal val="#ppt_y+.1"/>
+                                          </p:val>
+                                        </p:tav>
+                                        <p:tav tm="100000">
+                                          <p:val>
+                                            <p:strVal val="#ppt_y"/>
+                                          </p:val>
+                                        </p:tav>
+                                      </p:tavLst>
+                                    </p:anim>
+                                  </p:childTnLst>
+                                </p:cTn>
+                              </p:par>
+                            </p:childTnLst>
+                          </p:cTn>
+                        </p:par>
+                      </p:childTnLst>
+                    </p:cTn>
+                  </p:par>
+                  <p:par>
+                    <p:cTn id="66" fill="hold">
+                      <p:stCondLst>
+                        <p:cond delay="indefinite"/>
+                      </p:stCondLst>
+                      <p:childTnLst>
+                        <p:par>
+                          <p:cTn id="67" fill="hold">
+                            <p:stCondLst>
+                              <p:cond delay="0"/>
+                            </p:stCondLst>
+                            <p:childTnLst>
+                              <p:par>
+                                <p:cTn id="68" presetID="21" presetClass="entr" presetSubtype="1" fill="hold" grpId="0" nodeType="clickEffect">
+                                  <p:stCondLst>
+                                    <p:cond delay="0"/>
+                                  </p:stCondLst>
+                                  <p:childTnLst>
+                                    <p:set>
+                                      <p:cBhvr>
+                                        <p:cTn id="69" dur="1" fill="hold">
                                           <p:stCondLst>
                                             <p:cond delay="0"/>
                                           </p:stCondLst>
@@ -25698,79 +26450,9 @@
                                     </p:set>
                                     <p:animEffect transition="in" filter="wheel(1)">
                                       <p:cBhvr>
-                                        <p:cTn id="64" dur="2000"/>
+                                        <p:cTn id="70" dur="2000"/>
                                         <p:tgtEl>
                                           <p:spTgt spid="2"/>
-                                        </p:tgtEl>
-                                      </p:cBhvr>
-                                    </p:animEffect>
-                                  </p:childTnLst>
-                                </p:cTn>
-                              </p:par>
-                              <p:par>
-                                <p:cTn id="65" presetID="21" presetClass="entr" presetSubtype="1" fill="hold" grpId="0" nodeType="withEffect">
-                                  <p:stCondLst>
-                                    <p:cond delay="0"/>
-                                  </p:stCondLst>
-                                  <p:childTnLst>
-                                    <p:set>
-                                      <p:cBhvr>
-                                        <p:cTn id="66" dur="1" fill="hold">
-                                          <p:stCondLst>
-                                            <p:cond delay="0"/>
-                                          </p:stCondLst>
-                                        </p:cTn>
-                                        <p:tgtEl>
-                                          <p:spTgt spid="39"/>
-                                        </p:tgtEl>
-                                        <p:attrNameLst>
-                                          <p:attrName>style.visibility</p:attrName>
-                                        </p:attrNameLst>
-                                      </p:cBhvr>
-                                      <p:to>
-                                        <p:strVal val="visible"/>
-                                      </p:to>
-                                    </p:set>
-                                    <p:animEffect transition="in" filter="wheel(1)">
-                                      <p:cBhvr>
-                                        <p:cTn id="67" dur="2000"/>
-                                        <p:tgtEl>
-                                          <p:spTgt spid="39"/>
-                                        </p:tgtEl>
-                                      </p:cBhvr>
-                                    </p:animEffect>
-                                  </p:childTnLst>
-                                </p:cTn>
-                              </p:par>
-                              <p:par>
-                                <p:cTn id="68" presetID="21" presetClass="entr" presetSubtype="1" fill="hold" grpId="0" nodeType="withEffect">
-                                  <p:stCondLst>
-                                    <p:cond delay="0"/>
-                                  </p:stCondLst>
-                                  <p:childTnLst>
-                                    <p:set>
-                                      <p:cBhvr>
-                                        <p:cTn id="69" dur="1" fill="hold">
-                                          <p:stCondLst>
-                                            <p:cond delay="0"/>
-                                          </p:stCondLst>
-                                        </p:cTn>
-                                        <p:tgtEl>
-                                          <p:spTgt spid="40"/>
-                                        </p:tgtEl>
-                                        <p:attrNameLst>
-                                          <p:attrName>style.visibility</p:attrName>
-                                        </p:attrNameLst>
-                                      </p:cBhvr>
-                                      <p:to>
-                                        <p:strVal val="visible"/>
-                                      </p:to>
-                                    </p:set>
-                                    <p:animEffect transition="in" filter="wheel(1)">
-                                      <p:cBhvr>
-                                        <p:cTn id="70" dur="2000"/>
-                                        <p:tgtEl>
-                                          <p:spTgt spid="40"/>
                                         </p:tgtEl>
                                       </p:cBhvr>
                                     </p:animEffect>
@@ -25791,7 +26473,7 @@
                                           </p:stCondLst>
                                         </p:cTn>
                                         <p:tgtEl>
-                                          <p:spTgt spid="44"/>
+                                          <p:spTgt spid="39"/>
                                         </p:tgtEl>
                                         <p:attrNameLst>
                                           <p:attrName>style.visibility</p:attrName>
@@ -25805,7 +26487,7 @@
                                       <p:cBhvr>
                                         <p:cTn id="73" dur="2000"/>
                                         <p:tgtEl>
-                                          <p:spTgt spid="44"/>
+                                          <p:spTgt spid="39"/>
                                         </p:tgtEl>
                                       </p:cBhvr>
                                     </p:animEffect>
@@ -25826,6 +26508,146 @@
                                           </p:stCondLst>
                                         </p:cTn>
                                         <p:tgtEl>
+                                          <p:spTgt spid="40"/>
+                                        </p:tgtEl>
+                                        <p:attrNameLst>
+                                          <p:attrName>style.visibility</p:attrName>
+                                        </p:attrNameLst>
+                                      </p:cBhvr>
+                                      <p:to>
+                                        <p:strVal val="visible"/>
+                                      </p:to>
+                                    </p:set>
+                                    <p:animEffect transition="in" filter="wheel(1)">
+                                      <p:cBhvr>
+                                        <p:cTn id="76" dur="2000"/>
+                                        <p:tgtEl>
+                                          <p:spTgt spid="40"/>
+                                        </p:tgtEl>
+                                      </p:cBhvr>
+                                    </p:animEffect>
+                                  </p:childTnLst>
+                                </p:cTn>
+                              </p:par>
+                              <p:par>
+                                <p:cTn id="77" presetID="21" presetClass="entr" presetSubtype="1" fill="hold" grpId="0" nodeType="withEffect">
+                                  <p:stCondLst>
+                                    <p:cond delay="0"/>
+                                  </p:stCondLst>
+                                  <p:childTnLst>
+                                    <p:set>
+                                      <p:cBhvr>
+                                        <p:cTn id="78" dur="1" fill="hold">
+                                          <p:stCondLst>
+                                            <p:cond delay="0"/>
+                                          </p:stCondLst>
+                                        </p:cTn>
+                                        <p:tgtEl>
+                                          <p:spTgt spid="44"/>
+                                        </p:tgtEl>
+                                        <p:attrNameLst>
+                                          <p:attrName>style.visibility</p:attrName>
+                                        </p:attrNameLst>
+                                      </p:cBhvr>
+                                      <p:to>
+                                        <p:strVal val="visible"/>
+                                      </p:to>
+                                    </p:set>
+                                    <p:animEffect transition="in" filter="wheel(1)">
+                                      <p:cBhvr>
+                                        <p:cTn id="79" dur="2000"/>
+                                        <p:tgtEl>
+                                          <p:spTgt spid="44"/>
+                                        </p:tgtEl>
+                                      </p:cBhvr>
+                                    </p:animEffect>
+                                  </p:childTnLst>
+                                </p:cTn>
+                              </p:par>
+                              <p:par>
+                                <p:cTn id="80" presetID="21" presetClass="entr" presetSubtype="1" fill="hold" grpId="0" nodeType="withEffect">
+                                  <p:stCondLst>
+                                    <p:cond delay="0"/>
+                                  </p:stCondLst>
+                                  <p:childTnLst>
+                                    <p:set>
+                                      <p:cBhvr>
+                                        <p:cTn id="81" dur="1" fill="hold">
+                                          <p:stCondLst>
+                                            <p:cond delay="0"/>
+                                          </p:stCondLst>
+                                        </p:cTn>
+                                        <p:tgtEl>
+                                          <p:spTgt spid="50"/>
+                                        </p:tgtEl>
+                                        <p:attrNameLst>
+                                          <p:attrName>style.visibility</p:attrName>
+                                        </p:attrNameLst>
+                                      </p:cBhvr>
+                                      <p:to>
+                                        <p:strVal val="visible"/>
+                                      </p:to>
+                                    </p:set>
+                                    <p:animEffect transition="in" filter="wheel(1)">
+                                      <p:cBhvr>
+                                        <p:cTn id="82" dur="2000"/>
+                                        <p:tgtEl>
+                                          <p:spTgt spid="50"/>
+                                        </p:tgtEl>
+                                      </p:cBhvr>
+                                    </p:animEffect>
+                                  </p:childTnLst>
+                                </p:cTn>
+                              </p:par>
+                              <p:par>
+                                <p:cTn id="83" presetID="21" presetClass="entr" presetSubtype="1" fill="hold" grpId="0" nodeType="withEffect">
+                                  <p:stCondLst>
+                                    <p:cond delay="0"/>
+                                  </p:stCondLst>
+                                  <p:childTnLst>
+                                    <p:set>
+                                      <p:cBhvr>
+                                        <p:cTn id="84" dur="1" fill="hold">
+                                          <p:stCondLst>
+                                            <p:cond delay="0"/>
+                                          </p:stCondLst>
+                                        </p:cTn>
+                                        <p:tgtEl>
+                                          <p:spTgt spid="51"/>
+                                        </p:tgtEl>
+                                        <p:attrNameLst>
+                                          <p:attrName>style.visibility</p:attrName>
+                                        </p:attrNameLst>
+                                      </p:cBhvr>
+                                      <p:to>
+                                        <p:strVal val="visible"/>
+                                      </p:to>
+                                    </p:set>
+                                    <p:animEffect transition="in" filter="wheel(1)">
+                                      <p:cBhvr>
+                                        <p:cTn id="85" dur="2000"/>
+                                        <p:tgtEl>
+                                          <p:spTgt spid="51"/>
+                                        </p:tgtEl>
+                                      </p:cBhvr>
+                                    </p:animEffect>
+                                  </p:childTnLst>
+                                </p:cTn>
+                              </p:par>
+                              <p:par>
+                                <p:cTn id="86" presetID="21" presetClass="entr" presetSubtype="1" fill="hold" grpId="0" nodeType="withEffect">
+                                  <p:stCondLst>
+                                    <p:cond delay="0"/>
+                                  </p:stCondLst>
+                                  <p:childTnLst>
+                                    <p:set>
+                                      <p:cBhvr>
+                                        <p:cTn id="87" dur="1" fill="hold">
+                                          <p:stCondLst>
+                                            <p:cond delay="0"/>
+                                          </p:stCondLst>
+                                        </p:cTn>
+                                        <p:tgtEl>
                                           <p:spTgt spid="45"/>
                                         </p:tgtEl>
                                         <p:attrNameLst>
@@ -25838,7 +26660,7 @@
                                     </p:set>
                                     <p:animEffect transition="in" filter="wheel(1)">
                                       <p:cBhvr>
-                                        <p:cTn id="76" dur="2000"/>
+                                        <p:cTn id="88" dur="2000"/>
                                         <p:tgtEl>
                                           <p:spTgt spid="45"/>
                                         </p:tgtEl>
@@ -25854,26 +26676,26 @@
                     </p:cTn>
                   </p:par>
                   <p:par>
-                    <p:cTn id="77" fill="hold">
+                    <p:cTn id="89" fill="hold">
                       <p:stCondLst>
                         <p:cond delay="indefinite"/>
                       </p:stCondLst>
                       <p:childTnLst>
                         <p:par>
-                          <p:cTn id="78" fill="hold">
+                          <p:cTn id="90" fill="hold">
                             <p:stCondLst>
                               <p:cond delay="0"/>
                             </p:stCondLst>
                             <p:childTnLst>
                               <p:par>
-                                <p:cTn id="79" presetID="22" presetClass="entr" presetSubtype="4" fill="hold" nodeType="clickEffect">
+                                <p:cTn id="91" presetID="22" presetClass="entr" presetSubtype="4" fill="hold" nodeType="clickEffect">
                                   <p:stCondLst>
                                     <p:cond delay="0"/>
                                   </p:stCondLst>
                                   <p:childTnLst>
                                     <p:set>
                                       <p:cBhvr>
-                                        <p:cTn id="80" dur="1" fill="hold">
+                                        <p:cTn id="92" dur="1" fill="hold">
                                           <p:stCondLst>
                                             <p:cond delay="0"/>
                                           </p:stCondLst>
@@ -25891,7 +26713,7 @@
                                     </p:set>
                                     <p:animEffect transition="in" filter="wipe(down)">
                                       <p:cBhvr>
-                                        <p:cTn id="81" dur="1000"/>
+                                        <p:cTn id="93" dur="1000"/>
                                         <p:tgtEl>
                                           <p:spTgt spid="38"/>
                                         </p:tgtEl>
@@ -25904,20 +26726,20 @@
                           </p:cTn>
                         </p:par>
                         <p:par>
-                          <p:cTn id="82" fill="hold">
+                          <p:cTn id="94" fill="hold">
                             <p:stCondLst>
                               <p:cond delay="1000"/>
                             </p:stCondLst>
                             <p:childTnLst>
                               <p:par>
-                                <p:cTn id="83" presetID="22" presetClass="entr" presetSubtype="1" fill="hold" grpId="0" nodeType="afterEffect">
+                                <p:cTn id="95" presetID="22" presetClass="entr" presetSubtype="1" fill="hold" grpId="0" nodeType="afterEffect">
                                   <p:stCondLst>
                                     <p:cond delay="0"/>
                                   </p:stCondLst>
                                   <p:childTnLst>
                                     <p:set>
                                       <p:cBhvr>
-                                        <p:cTn id="84" dur="1" fill="hold">
+                                        <p:cTn id="96" dur="1" fill="hold">
                                           <p:stCondLst>
                                             <p:cond delay="0"/>
                                           </p:stCondLst>
@@ -25937,7 +26759,7 @@
                                     </p:set>
                                     <p:animEffect transition="in" filter="wipe(up)">
                                       <p:cBhvr>
-                                        <p:cTn id="85" dur="500"/>
+                                        <p:cTn id="97" dur="500"/>
                                         <p:tgtEl>
                                           <p:spTgt spid="37">
                                             <p:bg/>
@@ -25952,20 +26774,20 @@
                           </p:cTn>
                         </p:par>
                         <p:par>
-                          <p:cTn id="86" fill="hold">
+                          <p:cTn id="98" fill="hold">
                             <p:stCondLst>
                               <p:cond delay="1500"/>
                             </p:stCondLst>
                             <p:childTnLst>
                               <p:par>
-                                <p:cTn id="87" presetID="22" presetClass="entr" presetSubtype="1" fill="hold" grpId="0" nodeType="afterEffect">
+                                <p:cTn id="99" presetID="22" presetClass="entr" presetSubtype="1" fill="hold" grpId="0" nodeType="afterEffect">
                                   <p:stCondLst>
                                     <p:cond delay="0"/>
                                   </p:stCondLst>
                                   <p:childTnLst>
                                     <p:set>
                                       <p:cBhvr>
-                                        <p:cTn id="88" dur="1" fill="hold">
+                                        <p:cTn id="100" dur="1" fill="hold">
                                           <p:stCondLst>
                                             <p:cond delay="0"/>
                                           </p:stCondLst>
@@ -25987,7 +26809,7 @@
                                     </p:set>
                                     <p:animEffect transition="in" filter="wipe(up)">
                                       <p:cBhvr>
-                                        <p:cTn id="89" dur="500"/>
+                                        <p:cTn id="101" dur="500"/>
                                         <p:tgtEl>
                                           <p:spTgt spid="37">
                                             <p:txEl>
@@ -26004,20 +26826,20 @@
                           </p:cTn>
                         </p:par>
                         <p:par>
-                          <p:cTn id="90" fill="hold">
+                          <p:cTn id="102" fill="hold">
                             <p:stCondLst>
                               <p:cond delay="2000"/>
                             </p:stCondLst>
                             <p:childTnLst>
                               <p:par>
-                                <p:cTn id="91" presetID="22" presetClass="entr" presetSubtype="1" fill="hold" grpId="0" nodeType="afterEffect">
+                                <p:cTn id="103" presetID="22" presetClass="entr" presetSubtype="1" fill="hold" grpId="0" nodeType="afterEffect">
                                   <p:stCondLst>
                                     <p:cond delay="0"/>
                                   </p:stCondLst>
                                   <p:childTnLst>
                                     <p:set>
                                       <p:cBhvr>
-                                        <p:cTn id="92" dur="1" fill="hold">
+                                        <p:cTn id="104" dur="1" fill="hold">
                                           <p:stCondLst>
                                             <p:cond delay="0"/>
                                           </p:stCondLst>
@@ -26039,7 +26861,7 @@
                                     </p:set>
                                     <p:animEffect transition="in" filter="wipe(up)">
                                       <p:cBhvr>
-                                        <p:cTn id="93" dur="500"/>
+                                        <p:cTn id="105" dur="500"/>
                                         <p:tgtEl>
                                           <p:spTgt spid="37">
                                             <p:txEl>
@@ -26056,20 +26878,20 @@
                           </p:cTn>
                         </p:par>
                         <p:par>
-                          <p:cTn id="94" fill="hold">
+                          <p:cTn id="106" fill="hold">
                             <p:stCondLst>
                               <p:cond delay="2500"/>
                             </p:stCondLst>
                             <p:childTnLst>
                               <p:par>
-                                <p:cTn id="95" presetID="22" presetClass="entr" presetSubtype="1" fill="hold" grpId="0" nodeType="afterEffect">
+                                <p:cTn id="107" presetID="22" presetClass="entr" presetSubtype="1" fill="hold" grpId="0" nodeType="afterEffect">
                                   <p:stCondLst>
                                     <p:cond delay="0"/>
                                   </p:stCondLst>
                                   <p:childTnLst>
                                     <p:set>
                                       <p:cBhvr>
-                                        <p:cTn id="96" dur="1" fill="hold">
+                                        <p:cTn id="108" dur="1" fill="hold">
                                           <p:stCondLst>
                                             <p:cond delay="0"/>
                                           </p:stCondLst>
@@ -26091,7 +26913,7 @@
                                     </p:set>
                                     <p:animEffect transition="in" filter="wipe(up)">
                                       <p:cBhvr>
-                                        <p:cTn id="97" dur="500"/>
+                                        <p:cTn id="109" dur="500"/>
                                         <p:tgtEl>
                                           <p:spTgt spid="37">
                                             <p:txEl>
@@ -26108,20 +26930,20 @@
                           </p:cTn>
                         </p:par>
                         <p:par>
-                          <p:cTn id="98" fill="hold">
+                          <p:cTn id="110" fill="hold">
                             <p:stCondLst>
                               <p:cond delay="3000"/>
                             </p:stCondLst>
                             <p:childTnLst>
                               <p:par>
-                                <p:cTn id="99" presetID="22" presetClass="entr" presetSubtype="1" fill="hold" grpId="0" nodeType="afterEffect">
+                                <p:cTn id="111" presetID="22" presetClass="entr" presetSubtype="1" fill="hold" grpId="0" nodeType="afterEffect">
                                   <p:stCondLst>
                                     <p:cond delay="0"/>
                                   </p:stCondLst>
                                   <p:childTnLst>
                                     <p:set>
                                       <p:cBhvr>
-                                        <p:cTn id="100" dur="1" fill="hold">
+                                        <p:cTn id="112" dur="1" fill="hold">
                                           <p:stCondLst>
                                             <p:cond delay="0"/>
                                           </p:stCondLst>
@@ -26143,7 +26965,7 @@
                                     </p:set>
                                     <p:animEffect transition="in" filter="wipe(up)">
                                       <p:cBhvr>
-                                        <p:cTn id="101" dur="500"/>
+                                        <p:cTn id="113" dur="500"/>
                                         <p:tgtEl>
                                           <p:spTgt spid="37">
                                             <p:txEl>
@@ -26194,6 +27016,8 @@
       <p:bldP spid="37" grpId="0" build="p" animBg="1"/>
       <p:bldP spid="44" grpId="0" animBg="1"/>
       <p:bldP spid="45" grpId="0" animBg="1"/>
+      <p:bldP spid="50" grpId="0" animBg="1"/>
+      <p:bldP spid="51" grpId="0" animBg="1"/>
     </p:bldLst>
   </p:timing>
 </p:sld>
@@ -28133,6 +28957,9 @@
                     <p:cTn id="3" fill="hold">
                       <p:stCondLst>
                         <p:cond delay="indefinite"/>
+                        <p:cond evt="onBegin" delay="0">
+                          <p:tn val="2"/>
+                        </p:cond>
                       </p:stCondLst>
                       <p:childTnLst>
                         <p:par>
@@ -28142,7 +28969,7 @@
                             </p:stCondLst>
                             <p:childTnLst>
                               <p:par>
-                                <p:cTn id="5" presetID="10" presetClass="entr" presetSubtype="0" fill="hold" grpId="0" nodeType="clickEffect">
+                                <p:cTn id="5" presetID="10" presetClass="entr" presetSubtype="0" fill="hold" grpId="0" nodeType="afterEffect">
                                   <p:stCondLst>
                                     <p:cond delay="0"/>
                                   </p:stCondLst>

</xml_diff>